<commit_message>
refactoring Gem slides to comply to new BDS diagram
</commit_message>
<xml_diff>
--- a/decks/01_gemfire_overview.pptx
+++ b/decks/01_gemfire_overview.pptx
@@ -26,7 +26,7 @@
     <p:sldId id="336" r:id="rId17"/>
     <p:sldId id="256" r:id="rId18"/>
   </p:sldIdLst>
-  <p:sldSz cx="9144000" cy="6858000" type="screen4x3"/>
+  <p:sldSz cx="9144000" cy="5143500" type="screen16x9"/>
   <p:notesSz cx="6858000" cy="9144000"/>
   <p:defaultTextStyle>
     <a:defPPr>
@@ -247,7 +247,7 @@
           <a:p>
             <a:fld id="{0F40C286-B2F1-4745-BADD-9E8B44C75F40}" type="datetimeFigureOut">
               <a:rPr lang="en-US" smtClean="0"/>
-              <a:t>2015-03-23</a:t>
+              <a:t>3/23/15</a:t>
             </a:fld>
             <a:endParaRPr lang="en-US"/>
           </a:p>
@@ -265,8 +265,8 @@
         </p:nvSpPr>
         <p:spPr>
           <a:xfrm>
-            <a:off x="1143000" y="685800"/>
-            <a:ext cx="4572000" cy="3429000"/>
+            <a:off x="381000" y="685800"/>
+            <a:ext cx="6096000" cy="3429000"/>
           </a:xfrm>
           <a:prstGeom prst="rect">
             <a:avLst/>
@@ -542,7 +542,12 @@
             <p:ph type="sldImg"/>
           </p:nvPr>
         </p:nvSpPr>
-        <p:spPr/>
+        <p:spPr>
+          <a:xfrm>
+            <a:off x="381000" y="685800"/>
+            <a:ext cx="6096000" cy="3429000"/>
+          </a:xfrm>
+        </p:spPr>
       </p:sp>
       <p:sp>
         <p:nvSpPr>
@@ -728,8 +733,8 @@
         </p:nvSpPr>
         <p:spPr bwMode="auto">
           <a:xfrm>
-            <a:off x="1155700" y="692150"/>
-            <a:ext cx="4554538" cy="3416300"/>
+            <a:off x="396875" y="692150"/>
+            <a:ext cx="6072188" cy="3416300"/>
           </a:xfrm>
           <a:noFill/>
           <a:ln>
@@ -816,8 +821,8 @@
         </p:nvSpPr>
         <p:spPr bwMode="auto">
           <a:xfrm>
-            <a:off x="1155700" y="692150"/>
-            <a:ext cx="4554538" cy="3416300"/>
+            <a:off x="396875" y="692150"/>
+            <a:ext cx="6072188" cy="3416300"/>
           </a:xfrm>
           <a:noFill/>
           <a:ln>
@@ -859,7 +864,6 @@
               <a:rPr lang="en-US" dirty="0" smtClean="0"/>
               <a:t>Partitioned Regions</a:t>
             </a:r>
-            <a:endParaRPr lang="en-US" dirty="0" smtClean="0"/>
           </a:p>
         </p:txBody>
       </p:sp>
@@ -900,8 +904,8 @@
         </p:nvSpPr>
         <p:spPr bwMode="auto">
           <a:xfrm>
-            <a:off x="1155700" y="692150"/>
-            <a:ext cx="4554538" cy="3416300"/>
+            <a:off x="396875" y="692150"/>
+            <a:ext cx="6072188" cy="3416300"/>
           </a:xfrm>
           <a:noFill/>
           <a:ln>
@@ -986,7 +990,12 @@
             <p:ph type="sldImg"/>
           </p:nvPr>
         </p:nvSpPr>
-        <p:spPr/>
+        <p:spPr>
+          <a:xfrm>
+            <a:off x="381000" y="685800"/>
+            <a:ext cx="6096000" cy="3429000"/>
+          </a:xfrm>
+        </p:spPr>
       </p:sp>
       <p:sp>
         <p:nvSpPr>
@@ -1395,7 +1404,12 @@
             <p:ph type="sldImg"/>
           </p:nvPr>
         </p:nvSpPr>
-        <p:spPr/>
+        <p:spPr>
+          <a:xfrm>
+            <a:off x="381000" y="685800"/>
+            <a:ext cx="6096000" cy="3429000"/>
+          </a:xfrm>
+        </p:spPr>
       </p:sp>
       <p:sp>
         <p:nvSpPr>
@@ -1759,7 +1773,12 @@
             <p:ph type="sldImg"/>
           </p:nvPr>
         </p:nvSpPr>
-        <p:spPr/>
+        <p:spPr>
+          <a:xfrm>
+            <a:off x="381000" y="685800"/>
+            <a:ext cx="6096000" cy="3429000"/>
+          </a:xfrm>
+        </p:spPr>
       </p:sp>
       <p:sp>
         <p:nvSpPr>
@@ -2303,7 +2322,12 @@
             <p:ph type="sldImg"/>
           </p:nvPr>
         </p:nvSpPr>
-        <p:spPr/>
+        <p:spPr>
+          <a:xfrm>
+            <a:off x="381000" y="685800"/>
+            <a:ext cx="6096000" cy="3429000"/>
+          </a:xfrm>
+        </p:spPr>
       </p:sp>
       <p:sp>
         <p:nvSpPr>
@@ -2808,7 +2832,12 @@
             <p:ph type="sldImg"/>
           </p:nvPr>
         </p:nvSpPr>
-        <p:spPr/>
+        <p:spPr>
+          <a:xfrm>
+            <a:off x="381000" y="685800"/>
+            <a:ext cx="6096000" cy="3429000"/>
+          </a:xfrm>
+        </p:spPr>
       </p:sp>
       <p:sp>
         <p:nvSpPr>
@@ -2900,7 +2929,12 @@
             <p:ph type="sldImg"/>
           </p:nvPr>
         </p:nvSpPr>
-        <p:spPr/>
+        <p:spPr>
+          <a:xfrm>
+            <a:off x="381000" y="685800"/>
+            <a:ext cx="6096000" cy="3429000"/>
+          </a:xfrm>
+        </p:spPr>
       </p:sp>
       <p:sp>
         <p:nvSpPr>
@@ -2994,8 +3028,8 @@
         </p:nvSpPr>
         <p:spPr bwMode="auto">
           <a:xfrm>
-            <a:off x="1155700" y="692150"/>
-            <a:ext cx="4554538" cy="3416300"/>
+            <a:off x="396875" y="692150"/>
+            <a:ext cx="6072188" cy="3416300"/>
           </a:xfrm>
           <a:noFill/>
           <a:ln>
@@ -3082,8 +3116,8 @@
         </p:nvSpPr>
         <p:spPr bwMode="auto">
           <a:xfrm>
-            <a:off x="1155700" y="692150"/>
-            <a:ext cx="4554538" cy="3416300"/>
+            <a:off x="396875" y="692150"/>
+            <a:ext cx="6072188" cy="3416300"/>
           </a:xfrm>
           <a:noFill/>
           <a:ln>
@@ -3125,7 +3159,6 @@
               <a:rPr lang="en-US" dirty="0" smtClean="0"/>
               <a:t>This shows how a client connects</a:t>
             </a:r>
-            <a:endParaRPr lang="en-US" dirty="0" smtClean="0"/>
           </a:p>
         </p:txBody>
       </p:sp>
@@ -3163,7 +3196,7 @@
         <p:spPr>
           <a:xfrm>
             <a:off x="0" y="0"/>
-            <a:ext cx="9144000" cy="6858000"/>
+            <a:ext cx="9144000" cy="5143500"/>
           </a:xfrm>
           <a:prstGeom prst="rect">
             <a:avLst/>
@@ -3214,7 +3247,7 @@
         </p:nvSpPr>
         <p:spPr bwMode="gray">
           <a:xfrm>
-            <a:off x="890588" y="2086020"/>
+            <a:off x="890589" y="1312908"/>
             <a:ext cx="4384145" cy="1006429"/>
           </a:xfrm>
           <a:prstGeom prst="rect">
@@ -3261,7 +3294,7 @@
         </p:nvSpPr>
         <p:spPr bwMode="gray">
           <a:xfrm>
-            <a:off x="890589" y="3511179"/>
+            <a:off x="890590" y="2633384"/>
             <a:ext cx="6048375" cy="369332"/>
           </a:xfrm>
           <a:prstGeom prst="rect">
@@ -3389,7 +3422,7 @@
         </p:nvSpPr>
         <p:spPr bwMode="gray">
           <a:xfrm>
-            <a:off x="908582" y="4946802"/>
+            <a:off x="908582" y="3710102"/>
             <a:ext cx="5026550" cy="276999"/>
           </a:xfrm>
           <a:prstGeom prst="rect">
@@ -3448,8 +3481,8 @@
         </p:nvSpPr>
         <p:spPr bwMode="gray">
           <a:xfrm>
-            <a:off x="0" y="6172201"/>
-            <a:ext cx="9144000" cy="514351"/>
+            <a:off x="0" y="4629151"/>
+            <a:ext cx="9144000" cy="385763"/>
           </a:xfrm>
           <a:prstGeom prst="rect">
             <a:avLst/>
@@ -3496,7 +3529,7 @@
         </p:nvSpPr>
         <p:spPr bwMode="gray">
           <a:xfrm flipH="1">
-            <a:off x="8553450" y="6695329"/>
+            <a:off x="8553450" y="5021497"/>
             <a:ext cx="533400" cy="123111"/>
           </a:xfrm>
           <a:prstGeom prst="rect">
@@ -3576,7 +3609,7 @@
         </p:nvSpPr>
         <p:spPr bwMode="gray">
           <a:xfrm>
-            <a:off x="366714" y="6691266"/>
+            <a:off x="366715" y="5018450"/>
             <a:ext cx="2274887" cy="100027"/>
           </a:xfrm>
           <a:prstGeom prst="rect">
@@ -3655,8 +3688,8 @@
         </p:blipFill>
         <p:spPr>
           <a:xfrm>
-            <a:off x="7941733" y="6285289"/>
-            <a:ext cx="957262" cy="292607"/>
+            <a:off x="7941733" y="4713967"/>
+            <a:ext cx="957262" cy="219455"/>
           </a:xfrm>
           <a:prstGeom prst="rect">
             <a:avLst/>
@@ -3710,8 +3743,8 @@
         </p:nvSpPr>
         <p:spPr bwMode="gray">
           <a:xfrm>
-            <a:off x="366715" y="1432984"/>
-            <a:ext cx="2073275" cy="4510616"/>
+            <a:off x="366716" y="1074738"/>
+            <a:ext cx="2073275" cy="3382962"/>
           </a:xfrm>
           <a:prstGeom prst="rect">
             <a:avLst/>
@@ -3781,8 +3814,8 @@
         </p:nvSpPr>
         <p:spPr bwMode="gray">
           <a:xfrm>
-            <a:off x="366714" y="433918"/>
-            <a:ext cx="8410575" cy="613833"/>
+            <a:off x="366715" y="325439"/>
+            <a:ext cx="8410575" cy="460375"/>
           </a:xfrm>
           <a:prstGeom prst="rect">
             <a:avLst/>
@@ -3826,8 +3859,8 @@
         </p:nvSpPr>
         <p:spPr bwMode="gray">
           <a:xfrm>
-            <a:off x="2728913" y="1432984"/>
-            <a:ext cx="6048376" cy="4510616"/>
+            <a:off x="2728913" y="1074738"/>
+            <a:ext cx="6048376" cy="3382962"/>
           </a:xfrm>
           <a:prstGeom prst="rect">
             <a:avLst/>
@@ -4005,8 +4038,8 @@
         </p:nvSpPr>
         <p:spPr bwMode="gray">
           <a:xfrm>
-            <a:off x="366715" y="1892301"/>
-            <a:ext cx="2073275" cy="4051300"/>
+            <a:off x="366716" y="1419226"/>
+            <a:ext cx="2073275" cy="3038475"/>
           </a:xfrm>
           <a:prstGeom prst="rect">
             <a:avLst/>
@@ -4077,8 +4110,8 @@
         </p:nvSpPr>
         <p:spPr bwMode="gray">
           <a:xfrm>
-            <a:off x="366714" y="433918"/>
-            <a:ext cx="8410575" cy="613833"/>
+            <a:off x="366715" y="325439"/>
+            <a:ext cx="8410575" cy="460375"/>
           </a:xfrm>
           <a:prstGeom prst="rect">
             <a:avLst/>
@@ -4122,8 +4155,8 @@
         </p:nvSpPr>
         <p:spPr bwMode="gray">
           <a:xfrm>
-            <a:off x="366714" y="1047752"/>
-            <a:ext cx="8410575" cy="461625"/>
+            <a:off x="366715" y="785814"/>
+            <a:ext cx="8410575" cy="346219"/>
           </a:xfrm>
           <a:prstGeom prst="rect">
             <a:avLst/>
@@ -4201,8 +4234,8 @@
         </p:nvSpPr>
         <p:spPr bwMode="gray">
           <a:xfrm>
-            <a:off x="2728913" y="1892299"/>
-            <a:ext cx="6048376" cy="4051300"/>
+            <a:off x="2728913" y="1419224"/>
+            <a:ext cx="6048376" cy="3038475"/>
           </a:xfrm>
           <a:prstGeom prst="rect">
             <a:avLst/>
@@ -4385,8 +4418,8 @@
         </p:nvSpPr>
         <p:spPr bwMode="gray">
           <a:xfrm>
-            <a:off x="366714" y="433918"/>
-            <a:ext cx="8410575" cy="613833"/>
+            <a:off x="366715" y="325439"/>
+            <a:ext cx="8410575" cy="460375"/>
           </a:xfrm>
           <a:prstGeom prst="rect">
             <a:avLst/>
@@ -4430,8 +4463,8 @@
         </p:nvSpPr>
         <p:spPr bwMode="gray">
           <a:xfrm>
-            <a:off x="366715" y="1432984"/>
-            <a:ext cx="4032465" cy="4510616"/>
+            <a:off x="366716" y="1074738"/>
+            <a:ext cx="4032465" cy="3382962"/>
           </a:xfrm>
           <a:prstGeom prst="rect">
             <a:avLst/>
@@ -4579,8 +4612,8 @@
         </p:nvSpPr>
         <p:spPr bwMode="gray">
           <a:xfrm>
-            <a:off x="4744824" y="1432984"/>
-            <a:ext cx="4032465" cy="4510616"/>
+            <a:off x="4744825" y="1074738"/>
+            <a:ext cx="4032465" cy="3382962"/>
           </a:xfrm>
           <a:prstGeom prst="rect">
             <a:avLst/>
@@ -4800,7 +4833,7 @@
         <p:spPr>
           <a:xfrm>
             <a:off x="0" y="0"/>
-            <a:ext cx="9144000" cy="6858000"/>
+            <a:ext cx="9144000" cy="5143500"/>
           </a:xfrm>
           <a:prstGeom prst="rect">
             <a:avLst/>
@@ -4847,8 +4880,8 @@
         </p:nvSpPr>
         <p:spPr bwMode="gray">
           <a:xfrm>
-            <a:off x="0" y="6172201"/>
-            <a:ext cx="9144000" cy="514351"/>
+            <a:off x="0" y="4629151"/>
+            <a:ext cx="9144000" cy="385763"/>
           </a:xfrm>
           <a:prstGeom prst="rect">
             <a:avLst/>
@@ -4895,7 +4928,7 @@
         </p:nvSpPr>
         <p:spPr bwMode="gray">
           <a:xfrm flipH="1">
-            <a:off x="8553450" y="6695329"/>
+            <a:off x="8553450" y="5021497"/>
             <a:ext cx="533400" cy="123111"/>
           </a:xfrm>
           <a:prstGeom prst="rect">
@@ -4975,7 +5008,7 @@
         </p:nvSpPr>
         <p:spPr bwMode="gray">
           <a:xfrm>
-            <a:off x="366714" y="6691266"/>
+            <a:off x="366715" y="5018450"/>
             <a:ext cx="2274887" cy="100027"/>
           </a:xfrm>
           <a:prstGeom prst="rect">
@@ -5054,8 +5087,8 @@
         </p:blipFill>
         <p:spPr>
           <a:xfrm>
-            <a:off x="7941733" y="6285289"/>
-            <a:ext cx="957262" cy="292607"/>
+            <a:off x="7941733" y="4713967"/>
+            <a:ext cx="957262" cy="219455"/>
           </a:xfrm>
           <a:prstGeom prst="rect">
             <a:avLst/>
@@ -5114,7 +5147,7 @@
         <p:spPr>
           <a:xfrm>
             <a:off x="0" y="0"/>
-            <a:ext cx="9144000" cy="6858000"/>
+            <a:ext cx="9144000" cy="5143500"/>
           </a:xfrm>
           <a:prstGeom prst="rect">
             <a:avLst/>
@@ -5167,7 +5200,7 @@
         </p:nvSpPr>
         <p:spPr>
           <a:xfrm>
-            <a:off x="1701800" y="4125384"/>
+            <a:off x="1701800" y="3094038"/>
             <a:ext cx="5689600" cy="461665"/>
           </a:xfrm>
           <a:prstGeom prst="rect">
@@ -5329,8 +5362,8 @@
         </p:blipFill>
         <p:spPr bwMode="auto">
           <a:xfrm>
-            <a:off x="1973264" y="2211918"/>
-            <a:ext cx="5189537" cy="1680633"/>
+            <a:off x="1973265" y="1658939"/>
+            <a:ext cx="5189537" cy="1260475"/>
           </a:xfrm>
           <a:prstGeom prst="rect">
             <a:avLst/>
@@ -5391,8 +5424,8 @@
         </p:nvSpPr>
         <p:spPr>
           <a:xfrm>
-            <a:off x="685800" y="2130428"/>
-            <a:ext cx="7772400" cy="1470025"/>
+            <a:off x="685800" y="1597821"/>
+            <a:ext cx="7772400" cy="1102519"/>
           </a:xfrm>
           <a:prstGeom prst="rect">
             <a:avLst/>
@@ -5422,8 +5455,8 @@
         </p:nvSpPr>
         <p:spPr>
           <a:xfrm>
-            <a:off x="1371600" y="3886200"/>
-            <a:ext cx="6400800" cy="1752600"/>
+            <a:off x="1371600" y="2914650"/>
+            <a:ext cx="6400800" cy="1314450"/>
           </a:xfrm>
           <a:prstGeom prst="rect">
             <a:avLst/>
@@ -5544,8 +5577,8 @@
         </p:nvSpPr>
         <p:spPr>
           <a:xfrm>
-            <a:off x="457200" y="6356352"/>
-            <a:ext cx="2133600" cy="365125"/>
+            <a:off x="457200" y="4767264"/>
+            <a:ext cx="2133600" cy="273844"/>
           </a:xfrm>
           <a:prstGeom prst="rect">
             <a:avLst/>
@@ -5557,7 +5590,7 @@
           <a:p>
             <a:fld id="{E103E7AC-D3BD-7B4F-84F3-CF1D2349A443}" type="datetimeFigureOut">
               <a:rPr lang="en-US" smtClean="0"/>
-              <a:t>2015-03-23</a:t>
+              <a:t>3/23/15</a:t>
             </a:fld>
             <a:endParaRPr lang="en-US"/>
           </a:p>
@@ -5575,8 +5608,8 @@
         </p:nvSpPr>
         <p:spPr>
           <a:xfrm>
-            <a:off x="3124200" y="6356352"/>
-            <a:ext cx="2895600" cy="365125"/>
+            <a:off x="3124200" y="4767264"/>
+            <a:ext cx="2895600" cy="273844"/>
           </a:xfrm>
           <a:prstGeom prst="rect">
             <a:avLst/>
@@ -5602,8 +5635,8 @@
         </p:nvSpPr>
         <p:spPr>
           <a:xfrm>
-            <a:off x="6553200" y="6356352"/>
-            <a:ext cx="2133600" cy="365125"/>
+            <a:off x="6553200" y="4767264"/>
+            <a:ext cx="2133600" cy="273844"/>
           </a:xfrm>
           <a:prstGeom prst="rect">
             <a:avLst/>
@@ -5660,7 +5693,7 @@
         <p:spPr>
           <a:xfrm>
             <a:off x="0" y="1"/>
-            <a:ext cx="9144000" cy="60959"/>
+            <a:ext cx="9144000" cy="45719"/>
           </a:xfrm>
           <a:prstGeom prst="rect">
             <a:avLst/>
@@ -5709,8 +5742,8 @@
         </p:nvSpPr>
         <p:spPr bwMode="auto">
           <a:xfrm>
-            <a:off x="304801" y="408518"/>
-            <a:ext cx="8537575" cy="372319"/>
+            <a:off x="304802" y="306389"/>
+            <a:ext cx="8537575" cy="279239"/>
           </a:xfrm>
           <a:prstGeom prst="rect">
             <a:avLst/>
@@ -5752,8 +5785,8 @@
         </p:nvSpPr>
         <p:spPr>
           <a:xfrm>
-            <a:off x="304801" y="1066800"/>
-            <a:ext cx="8537575" cy="4885267"/>
+            <a:off x="304802" y="800101"/>
+            <a:ext cx="8537575" cy="3663950"/>
           </a:xfrm>
           <a:prstGeom prst="rect">
             <a:avLst/>
@@ -5849,7 +5882,7 @@
         <p:spPr>
           <a:xfrm>
             <a:off x="0" y="0"/>
-            <a:ext cx="9144000" cy="6858000"/>
+            <a:ext cx="9144000" cy="5143500"/>
           </a:xfrm>
           <a:prstGeom prst="rect">
             <a:avLst/>
@@ -5896,8 +5929,8 @@
         </p:nvSpPr>
         <p:spPr bwMode="gray">
           <a:xfrm>
-            <a:off x="0" y="6172201"/>
-            <a:ext cx="9144000" cy="514351"/>
+            <a:off x="0" y="4629151"/>
+            <a:ext cx="9144000" cy="385763"/>
           </a:xfrm>
           <a:prstGeom prst="rect">
             <a:avLst/>
@@ -5944,7 +5977,7 @@
         </p:nvSpPr>
         <p:spPr bwMode="gray">
           <a:xfrm flipH="1">
-            <a:off x="8553450" y="6695329"/>
+            <a:off x="8553450" y="5021497"/>
             <a:ext cx="533400" cy="123111"/>
           </a:xfrm>
           <a:prstGeom prst="rect">
@@ -6024,7 +6057,7 @@
         </p:nvSpPr>
         <p:spPr bwMode="gray">
           <a:xfrm>
-            <a:off x="366714" y="6691266"/>
+            <a:off x="366715" y="5018450"/>
             <a:ext cx="2274887" cy="100027"/>
           </a:xfrm>
           <a:prstGeom prst="rect">
@@ -6099,7 +6132,7 @@
         </p:nvSpPr>
         <p:spPr bwMode="gray">
           <a:xfrm>
-            <a:off x="1017588" y="2526802"/>
+            <a:off x="1017588" y="1739931"/>
             <a:ext cx="6048376" cy="620683"/>
           </a:xfrm>
           <a:prstGeom prst="rect">
@@ -6151,8 +6184,8 @@
         </p:nvSpPr>
         <p:spPr bwMode="gray">
           <a:xfrm>
-            <a:off x="1026054" y="3262838"/>
-            <a:ext cx="6048375" cy="750357"/>
+            <a:off x="1026055" y="2447129"/>
+            <a:ext cx="6048375" cy="562768"/>
           </a:xfrm>
           <a:prstGeom prst="rect">
             <a:avLst/>
@@ -6224,8 +6257,8 @@
         </p:blipFill>
         <p:spPr>
           <a:xfrm>
-            <a:off x="7941733" y="6285289"/>
-            <a:ext cx="957262" cy="292607"/>
+            <a:off x="7941733" y="4713967"/>
+            <a:ext cx="957262" cy="219455"/>
           </a:xfrm>
           <a:prstGeom prst="rect">
             <a:avLst/>
@@ -6276,7 +6309,7 @@
         <p:spPr bwMode="gray">
           <a:xfrm>
             <a:off x="0" y="1"/>
-            <a:ext cx="9144000" cy="2891335"/>
+            <a:ext cx="9144000" cy="2168501"/>
           </a:xfrm>
           <a:prstGeom prst="rect">
             <a:avLst/>
@@ -6338,7 +6371,7 @@
         </p:nvSpPr>
         <p:spPr bwMode="gray">
           <a:xfrm>
-            <a:off x="2728912" y="1737487"/>
+            <a:off x="2728912" y="995595"/>
             <a:ext cx="6048376" cy="1230080"/>
           </a:xfrm>
           <a:prstGeom prst="rect">
@@ -6385,8 +6418,8 @@
         </p:nvSpPr>
         <p:spPr bwMode="gray">
           <a:xfrm>
-            <a:off x="2728914" y="3274484"/>
-            <a:ext cx="6048375" cy="2535605"/>
+            <a:off x="2728915" y="2455863"/>
+            <a:ext cx="6048375" cy="1901704"/>
           </a:xfrm>
           <a:prstGeom prst="rect">
             <a:avLst/>
@@ -6545,7 +6578,7 @@
         <p:spPr>
           <a:xfrm>
             <a:off x="0" y="0"/>
-            <a:ext cx="9144000" cy="6858000"/>
+            <a:ext cx="9144000" cy="5143500"/>
           </a:xfrm>
           <a:prstGeom prst="rect">
             <a:avLst/>
@@ -6592,8 +6625,8 @@
         </p:nvSpPr>
         <p:spPr bwMode="gray">
           <a:xfrm>
-            <a:off x="0" y="6172201"/>
-            <a:ext cx="9144000" cy="514351"/>
+            <a:off x="0" y="4629151"/>
+            <a:ext cx="9144000" cy="385763"/>
           </a:xfrm>
           <a:prstGeom prst="rect">
             <a:avLst/>
@@ -6640,7 +6673,7 @@
         </p:nvSpPr>
         <p:spPr bwMode="gray">
           <a:xfrm flipH="1">
-            <a:off x="8553450" y="6695329"/>
+            <a:off x="8553450" y="5021497"/>
             <a:ext cx="533400" cy="123111"/>
           </a:xfrm>
           <a:prstGeom prst="rect">
@@ -6720,7 +6753,7 @@
         </p:nvSpPr>
         <p:spPr bwMode="gray">
           <a:xfrm>
-            <a:off x="366714" y="6691266"/>
+            <a:off x="366715" y="5018450"/>
             <a:ext cx="2274887" cy="100027"/>
           </a:xfrm>
           <a:prstGeom prst="rect">
@@ -6795,7 +6828,7 @@
         </p:nvSpPr>
         <p:spPr bwMode="gray">
           <a:xfrm>
-            <a:off x="670455" y="2683785"/>
+            <a:off x="670455" y="1674285"/>
             <a:ext cx="6048376" cy="1354217"/>
           </a:xfrm>
           <a:prstGeom prst="rect">
@@ -6854,8 +6887,8 @@
         </p:blipFill>
         <p:spPr>
           <a:xfrm>
-            <a:off x="7941733" y="6285289"/>
-            <a:ext cx="957262" cy="292607"/>
+            <a:off x="7941733" y="4713967"/>
+            <a:ext cx="957262" cy="219455"/>
           </a:xfrm>
           <a:prstGeom prst="rect">
             <a:avLst/>
@@ -6909,8 +6942,8 @@
         </p:nvSpPr>
         <p:spPr bwMode="gray">
           <a:xfrm>
-            <a:off x="366714" y="433918"/>
-            <a:ext cx="8410575" cy="613833"/>
+            <a:off x="366715" y="325439"/>
+            <a:ext cx="8410575" cy="460375"/>
           </a:xfrm>
           <a:prstGeom prst="rect">
             <a:avLst/>
@@ -6954,8 +6987,8 @@
         </p:nvSpPr>
         <p:spPr bwMode="gray">
           <a:xfrm>
-            <a:off x="366715" y="1432984"/>
-            <a:ext cx="8410575" cy="4510616"/>
+            <a:off x="366716" y="1074738"/>
+            <a:ext cx="8410575" cy="3382962"/>
           </a:xfrm>
           <a:prstGeom prst="rect">
             <a:avLst/>
@@ -7138,8 +7171,8 @@
         </p:nvSpPr>
         <p:spPr bwMode="gray">
           <a:xfrm>
-            <a:off x="366714" y="433918"/>
-            <a:ext cx="8410575" cy="613833"/>
+            <a:off x="366715" y="325439"/>
+            <a:ext cx="8410575" cy="460375"/>
           </a:xfrm>
           <a:prstGeom prst="rect">
             <a:avLst/>
@@ -7183,8 +7216,8 @@
         </p:nvSpPr>
         <p:spPr bwMode="gray">
           <a:xfrm>
-            <a:off x="366715" y="1432984"/>
-            <a:ext cx="8410575" cy="4510616"/>
+            <a:off x="366716" y="1074738"/>
+            <a:ext cx="8410575" cy="3382962"/>
           </a:xfrm>
           <a:prstGeom prst="rect">
             <a:avLst/>
@@ -7367,8 +7400,8 @@
         </p:nvSpPr>
         <p:spPr bwMode="gray">
           <a:xfrm>
-            <a:off x="366714" y="433918"/>
-            <a:ext cx="8410575" cy="613833"/>
+            <a:off x="366715" y="325439"/>
+            <a:ext cx="8410575" cy="460375"/>
           </a:xfrm>
           <a:prstGeom prst="rect">
             <a:avLst/>
@@ -7447,8 +7480,8 @@
         </p:nvSpPr>
         <p:spPr bwMode="gray">
           <a:xfrm>
-            <a:off x="366714" y="1047752"/>
-            <a:ext cx="8410575" cy="461625"/>
+            <a:off x="366715" y="785814"/>
+            <a:ext cx="8410575" cy="346219"/>
           </a:xfrm>
           <a:prstGeom prst="rect">
             <a:avLst/>
@@ -7525,8 +7558,8 @@
         </p:nvSpPr>
         <p:spPr bwMode="gray">
           <a:xfrm>
-            <a:off x="366714" y="433918"/>
-            <a:ext cx="8410575" cy="613833"/>
+            <a:off x="366715" y="325439"/>
+            <a:ext cx="8410575" cy="460375"/>
           </a:xfrm>
           <a:prstGeom prst="rect">
             <a:avLst/>
@@ -7604,8 +7637,8 @@
         </p:nvSpPr>
         <p:spPr bwMode="gray">
           <a:xfrm>
-            <a:off x="366714" y="1047752"/>
-            <a:ext cx="8410575" cy="461625"/>
+            <a:off x="366715" y="785814"/>
+            <a:ext cx="8410575" cy="346219"/>
           </a:xfrm>
           <a:prstGeom prst="rect">
             <a:avLst/>
@@ -7683,8 +7716,8 @@
         </p:nvSpPr>
         <p:spPr bwMode="gray">
           <a:xfrm>
-            <a:off x="366714" y="433918"/>
-            <a:ext cx="8410575" cy="613833"/>
+            <a:off x="366715" y="325439"/>
+            <a:ext cx="8410575" cy="460375"/>
           </a:xfrm>
           <a:prstGeom prst="rect">
             <a:avLst/>
@@ -7728,8 +7761,8 @@
         </p:nvSpPr>
         <p:spPr bwMode="gray">
           <a:xfrm>
-            <a:off x="366715" y="1892299"/>
-            <a:ext cx="8410574" cy="4051300"/>
+            <a:off x="366715" y="1419224"/>
+            <a:ext cx="8410574" cy="3038475"/>
           </a:xfrm>
           <a:prstGeom prst="rect">
             <a:avLst/>
@@ -7913,8 +7946,8 @@
         </p:nvSpPr>
         <p:spPr bwMode="gray">
           <a:xfrm>
-            <a:off x="0" y="6172201"/>
-            <a:ext cx="9144000" cy="514351"/>
+            <a:off x="0" y="4629151"/>
+            <a:ext cx="9144000" cy="385763"/>
           </a:xfrm>
           <a:prstGeom prst="rect">
             <a:avLst/>
@@ -7961,7 +7994,7 @@
         </p:nvSpPr>
         <p:spPr bwMode="gray">
           <a:xfrm flipH="1">
-            <a:off x="8553450" y="6695329"/>
+            <a:off x="8553450" y="5021497"/>
             <a:ext cx="533400" cy="123111"/>
           </a:xfrm>
           <a:prstGeom prst="rect">
@@ -8041,7 +8074,7 @@
         </p:nvSpPr>
         <p:spPr bwMode="gray">
           <a:xfrm>
-            <a:off x="366714" y="6691266"/>
+            <a:off x="366715" y="5018450"/>
             <a:ext cx="2274887" cy="100027"/>
           </a:xfrm>
           <a:prstGeom prst="rect">
@@ -8120,8 +8153,8 @@
         </p:blipFill>
         <p:spPr>
           <a:xfrm>
-            <a:off x="7941733" y="6285289"/>
-            <a:ext cx="957262" cy="292607"/>
+            <a:off x="7941733" y="4713967"/>
+            <a:ext cx="957262" cy="219455"/>
           </a:xfrm>
           <a:prstGeom prst="rect">
             <a:avLst/>
@@ -8457,7 +8490,7 @@
         </p:nvSpPr>
         <p:spPr>
           <a:xfrm>
-            <a:off x="890588" y="2584618"/>
+            <a:off x="890588" y="1811506"/>
             <a:ext cx="6249542" cy="507831"/>
           </a:xfrm>
         </p:spPr>
@@ -8590,8 +8623,8 @@
         </p:nvGrpSpPr>
         <p:grpSpPr>
           <a:xfrm>
-            <a:off x="929489" y="4357690"/>
-            <a:ext cx="2179730" cy="1646239"/>
+            <a:off x="929489" y="3268268"/>
+            <a:ext cx="2179730" cy="1234679"/>
             <a:chOff x="929489" y="3268267"/>
             <a:chExt cx="2179730" cy="1234679"/>
           </a:xfrm>
@@ -8650,7 +8683,7 @@
           <p:spPr bwMode="auto">
             <a:xfrm>
               <a:off x="2565174" y="4271965"/>
-              <a:ext cx="544045" cy="173124"/>
+              <a:ext cx="544045" cy="230832"/>
             </a:xfrm>
             <a:prstGeom prst="rect">
               <a:avLst/>
@@ -8714,8 +8747,8 @@
         </p:nvGrpSpPr>
         <p:grpSpPr>
           <a:xfrm>
-            <a:off x="3491714" y="4357690"/>
-            <a:ext cx="2179730" cy="1646239"/>
+            <a:off x="3491714" y="3268268"/>
+            <a:ext cx="2179730" cy="1234679"/>
             <a:chOff x="3491714" y="3268267"/>
             <a:chExt cx="2179730" cy="1234679"/>
           </a:xfrm>
@@ -8774,7 +8807,7 @@
           <p:spPr bwMode="auto">
             <a:xfrm>
               <a:off x="5127399" y="4271965"/>
-              <a:ext cx="544045" cy="173124"/>
+              <a:ext cx="544045" cy="230832"/>
             </a:xfrm>
             <a:prstGeom prst="rect">
               <a:avLst/>
@@ -8838,8 +8871,8 @@
         </p:nvGrpSpPr>
         <p:grpSpPr>
           <a:xfrm>
-            <a:off x="6053939" y="4357690"/>
-            <a:ext cx="2179730" cy="1646239"/>
+            <a:off x="6053939" y="3268268"/>
+            <a:ext cx="2179730" cy="1234679"/>
             <a:chOff x="6053939" y="3268267"/>
             <a:chExt cx="2179730" cy="1234679"/>
           </a:xfrm>
@@ -8898,7 +8931,7 @@
           <p:spPr bwMode="auto">
             <a:xfrm>
               <a:off x="7689624" y="4271965"/>
-              <a:ext cx="544045" cy="173124"/>
+              <a:ext cx="544045" cy="230832"/>
             </a:xfrm>
             <a:prstGeom prst="rect">
               <a:avLst/>
@@ -8962,8 +8995,8 @@
         </p:nvGrpSpPr>
         <p:grpSpPr>
           <a:xfrm>
-            <a:off x="3026570" y="4775199"/>
-            <a:ext cx="554831" cy="1209677"/>
+            <a:off x="3026571" y="3581400"/>
+            <a:ext cx="554831" cy="907258"/>
             <a:chOff x="3026569" y="3581399"/>
             <a:chExt cx="554831" cy="907258"/>
           </a:xfrm>
@@ -9310,8 +9343,8 @@
         </p:nvGrpSpPr>
         <p:grpSpPr>
           <a:xfrm>
-            <a:off x="5588795" y="4775199"/>
-            <a:ext cx="554831" cy="1209677"/>
+            <a:off x="5588796" y="3581400"/>
+            <a:ext cx="554831" cy="907258"/>
             <a:chOff x="3026569" y="3581399"/>
             <a:chExt cx="554831" cy="907258"/>
           </a:xfrm>
@@ -9658,8 +9691,8 @@
         </p:nvGrpSpPr>
         <p:grpSpPr>
           <a:xfrm>
-            <a:off x="3100573" y="5774933"/>
-            <a:ext cx="3131392" cy="704899"/>
+            <a:off x="3100573" y="4331200"/>
+            <a:ext cx="3131392" cy="528674"/>
             <a:chOff x="3100573" y="4331200"/>
             <a:chExt cx="3131392" cy="528674"/>
           </a:xfrm>
@@ -9919,7 +9952,7 @@
           <p:spPr>
             <a:xfrm>
               <a:off x="5800725" y="4514850"/>
-              <a:ext cx="431240" cy="138499"/>
+              <a:ext cx="431240" cy="184666"/>
             </a:xfrm>
             <a:prstGeom prst="rect">
               <a:avLst/>
@@ -9955,8 +9988,8 @@
         </p:nvGrpSpPr>
         <p:grpSpPr>
           <a:xfrm>
-            <a:off x="5648325" y="4432300"/>
-            <a:ext cx="431240" cy="428309"/>
+            <a:off x="5648325" y="3324225"/>
+            <a:ext cx="431240" cy="321232"/>
             <a:chOff x="5648325" y="3324225"/>
             <a:chExt cx="431240" cy="321232"/>
           </a:xfrm>
@@ -10006,7 +10039,7 @@
           <p:spPr>
             <a:xfrm>
               <a:off x="5648325" y="3324225"/>
-              <a:ext cx="431240" cy="138500"/>
+              <a:ext cx="431240" cy="184666"/>
             </a:xfrm>
             <a:prstGeom prst="rect">
               <a:avLst/>
@@ -10042,8 +10075,8 @@
         </p:nvGrpSpPr>
         <p:grpSpPr>
           <a:xfrm>
-            <a:off x="3076575" y="4432300"/>
-            <a:ext cx="431240" cy="428309"/>
+            <a:off x="3076575" y="3324225"/>
+            <a:ext cx="431240" cy="321232"/>
             <a:chOff x="3076575" y="3324225"/>
             <a:chExt cx="431240" cy="321232"/>
           </a:xfrm>
@@ -10093,7 +10126,7 @@
           <p:spPr>
             <a:xfrm>
               <a:off x="3076575" y="3324225"/>
-              <a:ext cx="431240" cy="138500"/>
+              <a:ext cx="431240" cy="184666"/>
             </a:xfrm>
             <a:prstGeom prst="rect">
               <a:avLst/>
@@ -10129,8 +10162,8 @@
         </p:nvGrpSpPr>
         <p:grpSpPr>
           <a:xfrm>
-            <a:off x="2748042" y="3429000"/>
-            <a:ext cx="1118314" cy="1066799"/>
+            <a:off x="2748042" y="2571750"/>
+            <a:ext cx="1118314" cy="800099"/>
             <a:chOff x="2748042" y="2571750"/>
             <a:chExt cx="1118314" cy="800099"/>
           </a:xfrm>
@@ -10287,7 +10320,7 @@
           <p:spPr>
             <a:xfrm>
               <a:off x="3020226" y="2571750"/>
-              <a:ext cx="595035" cy="138499"/>
+              <a:ext cx="595035" cy="184666"/>
             </a:xfrm>
             <a:prstGeom prst="rect">
               <a:avLst/>
@@ -10340,7 +10373,7 @@
           <p:spPr>
             <a:xfrm>
               <a:off x="3182657" y="2708275"/>
-              <a:ext cx="270176" cy="115416"/>
+              <a:ext cx="270176" cy="153888"/>
             </a:xfrm>
             <a:prstGeom prst="rect">
               <a:avLst/>
@@ -10412,7 +10445,7 @@
           <p:spPr>
             <a:xfrm>
               <a:off x="3166976" y="2978150"/>
-              <a:ext cx="301535" cy="115416"/>
+              <a:ext cx="301535" cy="153888"/>
             </a:xfrm>
             <a:prstGeom prst="rect">
               <a:avLst/>
@@ -10455,8 +10488,8 @@
         </p:nvGrpSpPr>
         <p:grpSpPr>
           <a:xfrm>
-            <a:off x="5256292" y="3429000"/>
-            <a:ext cx="1118314" cy="1066799"/>
+            <a:off x="5256292" y="2571750"/>
+            <a:ext cx="1118314" cy="800099"/>
             <a:chOff x="2748042" y="2571750"/>
             <a:chExt cx="1118314" cy="800099"/>
           </a:xfrm>
@@ -10613,7 +10646,7 @@
           <p:spPr>
             <a:xfrm>
               <a:off x="3020226" y="2571750"/>
-              <a:ext cx="595035" cy="138499"/>
+              <a:ext cx="595035" cy="184666"/>
             </a:xfrm>
             <a:prstGeom prst="rect">
               <a:avLst/>
@@ -10666,7 +10699,7 @@
           <p:spPr>
             <a:xfrm>
               <a:off x="3182657" y="2708275"/>
-              <a:ext cx="270176" cy="115416"/>
+              <a:ext cx="270176" cy="153888"/>
             </a:xfrm>
             <a:prstGeom prst="rect">
               <a:avLst/>
@@ -10738,7 +10771,7 @@
           <p:spPr>
             <a:xfrm>
               <a:off x="3166976" y="2978150"/>
-              <a:ext cx="301535" cy="115416"/>
+              <a:ext cx="301535" cy="153888"/>
             </a:xfrm>
             <a:prstGeom prst="rect">
               <a:avLst/>
@@ -10781,8 +10814,8 @@
         </p:nvSpPr>
         <p:spPr>
           <a:xfrm>
-            <a:off x="3990974" y="1322389"/>
-            <a:ext cx="4857751" cy="708024"/>
+            <a:off x="3990974" y="991792"/>
+            <a:ext cx="4857751" cy="531018"/>
           </a:xfrm>
           <a:prstGeom prst="rect">
             <a:avLst/>
@@ -10864,8 +10897,8 @@
         </p:nvSpPr>
         <p:spPr bwMode="auto">
           <a:xfrm>
-            <a:off x="1009650" y="2459568"/>
-            <a:ext cx="3524250" cy="1883833"/>
+            <a:off x="1009650" y="1844676"/>
+            <a:ext cx="3524250" cy="1412875"/>
           </a:xfrm>
           <a:custGeom>
             <a:avLst/>
@@ -10937,10 +10970,10 @@
         </p:nvGrpSpPr>
         <p:grpSpPr>
           <a:xfrm>
-            <a:off x="7979352" y="2505075"/>
-            <a:ext cx="728880" cy="740291"/>
+            <a:off x="7979352" y="1878807"/>
+            <a:ext cx="728880" cy="601385"/>
             <a:chOff x="7979351" y="1878806"/>
-            <a:chExt cx="728880" cy="555218"/>
+            <a:chExt cx="728880" cy="601385"/>
           </a:xfrm>
         </p:grpSpPr>
         <p:grpSp>
@@ -11030,7 +11063,7 @@
           <p:spPr>
             <a:xfrm>
               <a:off x="8240543" y="2295525"/>
-              <a:ext cx="466794" cy="138499"/>
+              <a:ext cx="466794" cy="184666"/>
             </a:xfrm>
             <a:prstGeom prst="rect">
               <a:avLst/>
@@ -11073,7 +11106,7 @@
           <p:spPr>
             <a:xfrm>
               <a:off x="7979351" y="1885950"/>
-              <a:ext cx="398629" cy="138499"/>
+              <a:ext cx="398629" cy="184666"/>
             </a:xfrm>
             <a:prstGeom prst="rect">
               <a:avLst/>
@@ -11109,10 +11142,10 @@
         </p:nvGrpSpPr>
         <p:grpSpPr>
           <a:xfrm>
-            <a:off x="449094" y="2505075"/>
-            <a:ext cx="727987" cy="740291"/>
+            <a:off x="449095" y="1878807"/>
+            <a:ext cx="727987" cy="601385"/>
             <a:chOff x="449093" y="1878806"/>
-            <a:chExt cx="727987" cy="555218"/>
+            <a:chExt cx="727987" cy="601385"/>
           </a:xfrm>
         </p:grpSpPr>
         <p:grpSp>
@@ -11202,7 +11235,7 @@
           <p:spPr>
             <a:xfrm>
               <a:off x="449093" y="2295525"/>
-              <a:ext cx="466794" cy="138499"/>
+              <a:ext cx="466794" cy="184666"/>
             </a:xfrm>
             <a:prstGeom prst="rect">
               <a:avLst/>
@@ -11245,7 +11278,7 @@
           <p:spPr>
             <a:xfrm>
               <a:off x="778451" y="1885950"/>
-              <a:ext cx="398629" cy="138499"/>
+              <a:ext cx="398629" cy="184666"/>
             </a:xfrm>
             <a:prstGeom prst="rect">
               <a:avLst/>
@@ -11281,8 +11314,8 @@
         </p:nvSpPr>
         <p:spPr bwMode="auto">
           <a:xfrm flipH="1">
-            <a:off x="4629150" y="2459568"/>
-            <a:ext cx="3524250" cy="1883833"/>
+            <a:off x="4629150" y="1844676"/>
+            <a:ext cx="3524250" cy="1412875"/>
           </a:xfrm>
           <a:custGeom>
             <a:avLst/>
@@ -11354,8 +11387,8 @@
         </p:nvSpPr>
         <p:spPr bwMode="auto">
           <a:xfrm>
-            <a:off x="1019176" y="2347384"/>
-            <a:ext cx="7143750" cy="421216"/>
+            <a:off x="1019176" y="1760538"/>
+            <a:ext cx="7143750" cy="315912"/>
           </a:xfrm>
           <a:custGeom>
             <a:avLst/>
@@ -11427,8 +11460,8 @@
         </p:nvSpPr>
         <p:spPr bwMode="auto">
           <a:xfrm>
-            <a:off x="1057276" y="2794001"/>
-            <a:ext cx="771525" cy="1562100"/>
+            <a:off x="1057277" y="2095501"/>
+            <a:ext cx="771525" cy="1171575"/>
           </a:xfrm>
           <a:custGeom>
             <a:avLst/>
@@ -11500,8 +11533,8 @@
         </p:nvSpPr>
         <p:spPr bwMode="auto">
           <a:xfrm>
-            <a:off x="1924050" y="2504017"/>
-            <a:ext cx="6191250" cy="1852083"/>
+            <a:off x="1924050" y="1878013"/>
+            <a:ext cx="6191250" cy="1389062"/>
           </a:xfrm>
           <a:custGeom>
             <a:avLst/>
@@ -11622,8 +11655,8 @@
         </p:blipFill>
         <p:spPr>
           <a:xfrm>
-            <a:off x="419101" y="2507177"/>
-            <a:ext cx="695324" cy="695324"/>
+            <a:off x="419101" y="1880383"/>
+            <a:ext cx="695324" cy="521493"/>
           </a:xfrm>
           <a:prstGeom prst="rect">
             <a:avLst/>
@@ -11657,8 +11690,8 @@
         </p:blipFill>
         <p:spPr>
           <a:xfrm>
-            <a:off x="419101" y="2509309"/>
-            <a:ext cx="695324" cy="695324"/>
+            <a:off x="419101" y="1881982"/>
+            <a:ext cx="695324" cy="521493"/>
           </a:xfrm>
           <a:prstGeom prst="rect">
             <a:avLst/>
@@ -11692,8 +11725,8 @@
         </p:blipFill>
         <p:spPr>
           <a:xfrm>
-            <a:off x="419101" y="2512467"/>
-            <a:ext cx="695324" cy="695324"/>
+            <a:off x="419101" y="1884350"/>
+            <a:ext cx="695324" cy="521493"/>
           </a:xfrm>
           <a:prstGeom prst="rect">
             <a:avLst/>
@@ -11708,8 +11741,8 @@
         </p:nvSpPr>
         <p:spPr bwMode="auto">
           <a:xfrm>
-            <a:off x="1066801" y="2440518"/>
-            <a:ext cx="5895975" cy="1915583"/>
+            <a:off x="1066802" y="1830389"/>
+            <a:ext cx="5895975" cy="1436687"/>
           </a:xfrm>
           <a:custGeom>
             <a:avLst/>
@@ -11781,8 +11814,8 @@
         </p:nvSpPr>
         <p:spPr bwMode="auto">
           <a:xfrm>
-            <a:off x="7089775" y="2736851"/>
-            <a:ext cx="1035050" cy="1619249"/>
+            <a:off x="7089775" y="2052639"/>
+            <a:ext cx="1035050" cy="1214437"/>
           </a:xfrm>
           <a:custGeom>
             <a:avLst/>
@@ -11873,8 +11906,8 @@
         </p:blipFill>
         <p:spPr>
           <a:xfrm>
-            <a:off x="419101" y="2509309"/>
-            <a:ext cx="695324" cy="695324"/>
+            <a:off x="419101" y="1881982"/>
+            <a:ext cx="695324" cy="521493"/>
           </a:xfrm>
           <a:prstGeom prst="rect">
             <a:avLst/>
@@ -11889,8 +11922,8 @@
         </p:nvGrpSpPr>
         <p:grpSpPr>
           <a:xfrm>
-            <a:off x="846218" y="3721099"/>
-            <a:ext cx="714119" cy="774700"/>
+            <a:off x="846219" y="2790824"/>
+            <a:ext cx="714119" cy="581025"/>
             <a:chOff x="846217" y="2790824"/>
             <a:chExt cx="714119" cy="581025"/>
           </a:xfrm>
@@ -11939,7 +11972,7 @@
           <p:spPr>
             <a:xfrm>
               <a:off x="1258801" y="2905125"/>
-              <a:ext cx="301535" cy="115416"/>
+              <a:ext cx="301535" cy="153888"/>
             </a:xfrm>
             <a:prstGeom prst="rect">
               <a:avLst/>
@@ -11982,8 +12015,8 @@
         </p:nvGrpSpPr>
         <p:grpSpPr>
           <a:xfrm>
-            <a:off x="1257301" y="2992967"/>
-            <a:ext cx="4402931" cy="1452032"/>
+            <a:off x="1257302" y="2244725"/>
+            <a:ext cx="4402931" cy="1089024"/>
             <a:chOff x="1257300" y="2244725"/>
             <a:chExt cx="4402931" cy="1089024"/>
           </a:xfrm>
@@ -12046,7 +12079,7 @@
             <p:spPr>
               <a:xfrm>
                 <a:off x="7452526" y="1095375"/>
-                <a:ext cx="595035" cy="138499"/>
+                <a:ext cx="595035" cy="184666"/>
               </a:xfrm>
               <a:prstGeom prst="rect">
                 <a:avLst/>
@@ -12099,7 +12132,7 @@
             <p:spPr>
               <a:xfrm>
                 <a:off x="7614957" y="1231900"/>
-                <a:ext cx="270176" cy="115416"/>
+                <a:ext cx="270176" cy="153888"/>
               </a:xfrm>
               <a:prstGeom prst="rect">
                 <a:avLst/>
@@ -12289,8 +12322,8 @@
         </p:nvGrpSpPr>
         <p:grpSpPr>
           <a:xfrm>
-            <a:off x="1228726" y="2753785"/>
-            <a:ext cx="7069931" cy="1742015"/>
+            <a:off x="1228727" y="2065339"/>
+            <a:ext cx="7069931" cy="1306511"/>
             <a:chOff x="1228725" y="2065338"/>
             <a:chExt cx="7069931" cy="1306511"/>
           </a:xfrm>
@@ -12339,7 +12372,7 @@
           <p:spPr>
             <a:xfrm>
               <a:off x="7452526" y="2571750"/>
-              <a:ext cx="595035" cy="138499"/>
+              <a:ext cx="595035" cy="184666"/>
             </a:xfrm>
             <a:prstGeom prst="rect">
               <a:avLst/>
@@ -12392,7 +12425,7 @@
           <p:spPr>
             <a:xfrm>
               <a:off x="7614957" y="2708275"/>
-              <a:ext cx="270176" cy="115416"/>
+              <a:ext cx="270176" cy="153888"/>
             </a:xfrm>
             <a:prstGeom prst="rect">
               <a:avLst/>
@@ -12581,10 +12614,10 @@
         </p:nvGrpSpPr>
         <p:grpSpPr>
           <a:xfrm>
-            <a:off x="39629" y="2882900"/>
-            <a:ext cx="608009" cy="819665"/>
+            <a:off x="39630" y="2162175"/>
+            <a:ext cx="608009" cy="660915"/>
             <a:chOff x="3497203" y="3438526"/>
-            <a:chExt cx="608009" cy="614749"/>
+            <a:chExt cx="608009" cy="660915"/>
           </a:xfrm>
         </p:grpSpPr>
         <p:sp>
@@ -12644,7 +12677,7 @@
           <p:spPr>
             <a:xfrm>
               <a:off x="3497203" y="3800475"/>
-              <a:ext cx="608009" cy="138500"/>
+              <a:ext cx="608009" cy="184666"/>
             </a:xfrm>
             <a:prstGeom prst="rect">
               <a:avLst/>
@@ -12680,7 +12713,7 @@
           <p:spPr>
             <a:xfrm>
               <a:off x="3507854" y="3914775"/>
-              <a:ext cx="586707" cy="138500"/>
+              <a:ext cx="586707" cy="184666"/>
             </a:xfrm>
             <a:prstGeom prst="rect">
               <a:avLst/>
@@ -12735,8 +12768,8 @@
         </p:blipFill>
         <p:spPr>
           <a:xfrm>
-            <a:off x="419101" y="2515643"/>
-            <a:ext cx="695324" cy="695324"/>
+            <a:off x="419101" y="1886732"/>
+            <a:ext cx="695324" cy="521493"/>
           </a:xfrm>
           <a:prstGeom prst="rect">
             <a:avLst/>
@@ -12770,8 +12803,8 @@
         </p:blipFill>
         <p:spPr>
           <a:xfrm>
-            <a:off x="419101" y="2518818"/>
-            <a:ext cx="695324" cy="695324"/>
+            <a:off x="419101" y="1889114"/>
+            <a:ext cx="695324" cy="521493"/>
           </a:xfrm>
           <a:prstGeom prst="rect">
             <a:avLst/>
@@ -12805,8 +12838,8 @@
         </p:blipFill>
         <p:spPr>
           <a:xfrm>
-            <a:off x="419101" y="2518818"/>
-            <a:ext cx="695324" cy="695324"/>
+            <a:off x="419101" y="1889114"/>
+            <a:ext cx="695324" cy="521493"/>
           </a:xfrm>
           <a:prstGeom prst="rect">
             <a:avLst/>
@@ -12840,8 +12873,8 @@
         </p:blipFill>
         <p:spPr>
           <a:xfrm>
-            <a:off x="419101" y="2520934"/>
-            <a:ext cx="695324" cy="695324"/>
+            <a:off x="419101" y="1890701"/>
+            <a:ext cx="695324" cy="521493"/>
           </a:xfrm>
           <a:prstGeom prst="rect">
             <a:avLst/>
@@ -12875,8 +12908,8 @@
         </p:blipFill>
         <p:spPr>
           <a:xfrm>
-            <a:off x="419101" y="2520934"/>
-            <a:ext cx="695324" cy="695324"/>
+            <a:off x="419101" y="1890701"/>
+            <a:ext cx="695324" cy="521493"/>
           </a:xfrm>
           <a:prstGeom prst="rect">
             <a:avLst/>
@@ -12910,8 +12943,8 @@
         </p:blipFill>
         <p:spPr>
           <a:xfrm>
-            <a:off x="419101" y="2509309"/>
-            <a:ext cx="695324" cy="695324"/>
+            <a:off x="419101" y="1881982"/>
+            <a:ext cx="695324" cy="521493"/>
           </a:xfrm>
           <a:prstGeom prst="rect">
             <a:avLst/>
@@ -15218,8 +15251,8 @@
         </p:nvGrpSpPr>
         <p:grpSpPr>
           <a:xfrm>
-            <a:off x="929489" y="4357690"/>
-            <a:ext cx="2179730" cy="1646239"/>
+            <a:off x="929489" y="3268268"/>
+            <a:ext cx="2179730" cy="1234679"/>
             <a:chOff x="929489" y="3268267"/>
             <a:chExt cx="2179730" cy="1234679"/>
           </a:xfrm>
@@ -15278,7 +15311,7 @@
           <p:spPr bwMode="auto">
             <a:xfrm>
               <a:off x="2565174" y="4271965"/>
-              <a:ext cx="544045" cy="173124"/>
+              <a:ext cx="544045" cy="230832"/>
             </a:xfrm>
             <a:prstGeom prst="rect">
               <a:avLst/>
@@ -15342,8 +15375,8 @@
         </p:nvGrpSpPr>
         <p:grpSpPr>
           <a:xfrm>
-            <a:off x="3491714" y="4357690"/>
-            <a:ext cx="2179730" cy="1646239"/>
+            <a:off x="3491714" y="3268268"/>
+            <a:ext cx="2179730" cy="1234679"/>
             <a:chOff x="3491714" y="3268267"/>
             <a:chExt cx="2179730" cy="1234679"/>
           </a:xfrm>
@@ -15402,7 +15435,7 @@
           <p:spPr bwMode="auto">
             <a:xfrm>
               <a:off x="5127399" y="4271965"/>
-              <a:ext cx="544045" cy="173124"/>
+              <a:ext cx="544045" cy="230832"/>
             </a:xfrm>
             <a:prstGeom prst="rect">
               <a:avLst/>
@@ -15466,8 +15499,8 @@
         </p:nvGrpSpPr>
         <p:grpSpPr>
           <a:xfrm>
-            <a:off x="6053939" y="4357690"/>
-            <a:ext cx="2179730" cy="1646239"/>
+            <a:off x="6053939" y="3268268"/>
+            <a:ext cx="2179730" cy="1234679"/>
             <a:chOff x="6053939" y="3268267"/>
             <a:chExt cx="2179730" cy="1234679"/>
           </a:xfrm>
@@ -15526,7 +15559,7 @@
           <p:spPr bwMode="auto">
             <a:xfrm>
               <a:off x="7689624" y="4271965"/>
-              <a:ext cx="544045" cy="173124"/>
+              <a:ext cx="544045" cy="230832"/>
             </a:xfrm>
             <a:prstGeom prst="rect">
               <a:avLst/>
@@ -15590,8 +15623,8 @@
         </p:nvGrpSpPr>
         <p:grpSpPr>
           <a:xfrm>
-            <a:off x="3026570" y="4775199"/>
-            <a:ext cx="554831" cy="1209677"/>
+            <a:off x="3026571" y="3581400"/>
+            <a:ext cx="554831" cy="907258"/>
             <a:chOff x="3026569" y="3581399"/>
             <a:chExt cx="554831" cy="907258"/>
           </a:xfrm>
@@ -15938,8 +15971,8 @@
         </p:nvGrpSpPr>
         <p:grpSpPr>
           <a:xfrm>
-            <a:off x="5588795" y="4775199"/>
-            <a:ext cx="554831" cy="1209677"/>
+            <a:off x="5588796" y="3581400"/>
+            <a:ext cx="554831" cy="907258"/>
             <a:chOff x="3026569" y="3581399"/>
             <a:chExt cx="554831" cy="907258"/>
           </a:xfrm>
@@ -16286,10 +16319,10 @@
         </p:nvGrpSpPr>
         <p:grpSpPr>
           <a:xfrm>
-            <a:off x="7979352" y="2505075"/>
-            <a:ext cx="728880" cy="740291"/>
+            <a:off x="7979352" y="1878807"/>
+            <a:ext cx="728880" cy="601385"/>
             <a:chOff x="7979351" y="1878806"/>
-            <a:chExt cx="728880" cy="555218"/>
+            <a:chExt cx="728880" cy="601385"/>
           </a:xfrm>
         </p:grpSpPr>
         <p:grpSp>
@@ -16379,7 +16412,7 @@
           <p:spPr>
             <a:xfrm>
               <a:off x="8240543" y="2295525"/>
-              <a:ext cx="466794" cy="138499"/>
+              <a:ext cx="466794" cy="184666"/>
             </a:xfrm>
             <a:prstGeom prst="rect">
               <a:avLst/>
@@ -16422,7 +16455,7 @@
           <p:spPr>
             <a:xfrm>
               <a:off x="7979351" y="1885950"/>
-              <a:ext cx="398629" cy="138499"/>
+              <a:ext cx="398629" cy="184666"/>
             </a:xfrm>
             <a:prstGeom prst="rect">
               <a:avLst/>
@@ -16458,10 +16491,10 @@
         </p:nvGrpSpPr>
         <p:grpSpPr>
           <a:xfrm>
-            <a:off x="449094" y="2505075"/>
-            <a:ext cx="727987" cy="740291"/>
+            <a:off x="449095" y="1878807"/>
+            <a:ext cx="727987" cy="601385"/>
             <a:chOff x="449093" y="1878806"/>
-            <a:chExt cx="727987" cy="555218"/>
+            <a:chExt cx="727987" cy="601385"/>
           </a:xfrm>
         </p:grpSpPr>
         <p:grpSp>
@@ -16551,7 +16584,7 @@
           <p:spPr>
             <a:xfrm>
               <a:off x="449093" y="2295525"/>
-              <a:ext cx="466794" cy="138499"/>
+              <a:ext cx="466794" cy="184666"/>
             </a:xfrm>
             <a:prstGeom prst="rect">
               <a:avLst/>
@@ -16594,7 +16627,7 @@
           <p:spPr>
             <a:xfrm>
               <a:off x="778451" y="1885950"/>
-              <a:ext cx="398629" cy="138499"/>
+              <a:ext cx="398629" cy="184666"/>
             </a:xfrm>
             <a:prstGeom prst="rect">
               <a:avLst/>
@@ -16630,8 +16663,8 @@
         </p:nvGrpSpPr>
         <p:grpSpPr>
           <a:xfrm>
-            <a:off x="1413382" y="790577"/>
-            <a:ext cx="2197293" cy="1662113"/>
+            <a:off x="1413383" y="592933"/>
+            <a:ext cx="2197293" cy="1246585"/>
             <a:chOff x="1413382" y="592932"/>
             <a:chExt cx="2197293" cy="1246585"/>
           </a:xfrm>
@@ -16704,7 +16737,7 @@
             <p:spPr bwMode="auto">
               <a:xfrm>
                 <a:off x="4851350" y="1393032"/>
-                <a:ext cx="813043" cy="173124"/>
+                <a:ext cx="813043" cy="230832"/>
               </a:xfrm>
               <a:prstGeom prst="rect">
                 <a:avLst/>
@@ -16791,8 +16824,8 @@
         </p:nvSpPr>
         <p:spPr bwMode="auto">
           <a:xfrm>
-            <a:off x="1419226" y="2101854"/>
-            <a:ext cx="2143125" cy="342900"/>
+            <a:off x="1419227" y="1576391"/>
+            <a:ext cx="2143125" cy="257175"/>
           </a:xfrm>
           <a:prstGeom prst="rect">
             <a:avLst/>
@@ -16863,8 +16896,8 @@
         </p:nvGrpSpPr>
         <p:grpSpPr>
           <a:xfrm>
-            <a:off x="934157" y="4191001"/>
-            <a:ext cx="7267575" cy="241299"/>
+            <a:off x="934158" y="3143251"/>
+            <a:ext cx="7267575" cy="180974"/>
             <a:chOff x="934156" y="3143251"/>
             <a:chExt cx="7267575" cy="180974"/>
           </a:xfrm>
@@ -17199,8 +17232,8 @@
         </p:nvSpPr>
         <p:spPr>
           <a:xfrm>
-            <a:off x="3990975" y="794811"/>
-            <a:ext cx="3781426" cy="1330323"/>
+            <a:off x="3990975" y="596109"/>
+            <a:ext cx="3781426" cy="997742"/>
           </a:xfrm>
           <a:prstGeom prst="rect">
             <a:avLst/>
@@ -17350,8 +17383,8 @@
         </p:nvCxnSpPr>
         <p:spPr bwMode="auto">
           <a:xfrm rot="10800000" flipV="1">
-            <a:off x="1057143" y="2438400"/>
-            <a:ext cx="727209" cy="271621"/>
+            <a:off x="1057144" y="1828800"/>
+            <a:ext cx="727209" cy="203716"/>
           </a:xfrm>
           <a:prstGeom prst="straightConnector1">
             <a:avLst/>
@@ -17379,8 +17412,8 @@
         </p:nvGrpSpPr>
         <p:grpSpPr>
           <a:xfrm>
-            <a:off x="1031876" y="2463745"/>
-            <a:ext cx="1111251" cy="393756"/>
+            <a:off x="1031877" y="1847809"/>
+            <a:ext cx="1111251" cy="295317"/>
             <a:chOff x="1031875" y="1847808"/>
             <a:chExt cx="1111251" cy="295317"/>
           </a:xfrm>
@@ -17508,8 +17541,8 @@
         </p:nvGrpSpPr>
         <p:grpSpPr>
           <a:xfrm>
-            <a:off x="1263650" y="2451100"/>
-            <a:ext cx="2562225" cy="1739901"/>
+            <a:off x="1263651" y="1838325"/>
+            <a:ext cx="2562225" cy="1304926"/>
             <a:chOff x="1263649" y="1838325"/>
             <a:chExt cx="2562225" cy="1304926"/>
           </a:xfrm>
@@ -17587,8 +17620,8 @@
         </p:nvCxnSpPr>
         <p:spPr bwMode="auto">
           <a:xfrm>
-            <a:off x="2105025" y="2463801"/>
-            <a:ext cx="4283074" cy="1727201"/>
+            <a:off x="2105025" y="1847851"/>
+            <a:ext cx="4283074" cy="1295401"/>
           </a:xfrm>
           <a:prstGeom prst="straightConnector1">
             <a:avLst/>
@@ -18153,11 +18186,7 @@
           <a:p>
             <a:r>
               <a:rPr lang="en-US" dirty="0" smtClean="0"/>
-              <a:t>Replicated </a:t>
-            </a:r>
-            <a:r>
-              <a:rPr lang="en-US" dirty="0" smtClean="0"/>
-              <a:t>Regions Overview</a:t>
+              <a:t>Replicated Regions Overview</a:t>
             </a:r>
             <a:endParaRPr lang="en-US" dirty="0"/>
           </a:p>
@@ -18173,8 +18202,8 @@
         </p:nvSpPr>
         <p:spPr bwMode="auto">
           <a:xfrm>
-            <a:off x="878777" y="2103005"/>
-            <a:ext cx="2155060" cy="1646239"/>
+            <a:off x="878777" y="1577254"/>
+            <a:ext cx="2155060" cy="1234679"/>
           </a:xfrm>
           <a:prstGeom prst="rect">
             <a:avLst/>
@@ -18216,8 +18245,8 @@
         </p:nvSpPr>
         <p:spPr bwMode="auto">
           <a:xfrm>
-            <a:off x="883444" y="2095068"/>
-            <a:ext cx="2143125" cy="82548"/>
+            <a:off x="883445" y="1571301"/>
+            <a:ext cx="2143125" cy="61911"/>
           </a:xfrm>
           <a:prstGeom prst="rect">
             <a:avLst/>
@@ -18282,8 +18311,8 @@
         </p:nvSpPr>
         <p:spPr bwMode="auto">
           <a:xfrm>
-            <a:off x="3441002" y="2103005"/>
-            <a:ext cx="2155060" cy="1646239"/>
+            <a:off x="3441002" y="1577254"/>
+            <a:ext cx="2155060" cy="1234679"/>
           </a:xfrm>
           <a:prstGeom prst="rect">
             <a:avLst/>
@@ -18325,8 +18354,8 @@
         </p:nvSpPr>
         <p:spPr bwMode="auto">
           <a:xfrm>
-            <a:off x="6003227" y="2103005"/>
-            <a:ext cx="2155060" cy="1646239"/>
+            <a:off x="6003227" y="1577254"/>
+            <a:ext cx="2155060" cy="1234679"/>
           </a:xfrm>
           <a:prstGeom prst="rect">
             <a:avLst/>
@@ -18366,8 +18395,8 @@
         </p:nvGrpSpPr>
         <p:grpSpPr>
           <a:xfrm>
-            <a:off x="2975858" y="2520514"/>
-            <a:ext cx="554831" cy="1209677"/>
+            <a:off x="2975859" y="1890386"/>
+            <a:ext cx="554831" cy="907258"/>
             <a:chOff x="3026569" y="3581399"/>
             <a:chExt cx="554831" cy="907258"/>
           </a:xfrm>
@@ -18716,8 +18745,8 @@
         </p:nvSpPr>
         <p:spPr bwMode="auto">
           <a:xfrm>
-            <a:off x="3445670" y="2095068"/>
-            <a:ext cx="2143125" cy="82548"/>
+            <a:off x="3445671" y="1571301"/>
+            <a:ext cx="2143125" cy="61911"/>
           </a:xfrm>
           <a:prstGeom prst="rect">
             <a:avLst/>
@@ -18782,8 +18811,8 @@
         </p:nvSpPr>
         <p:spPr bwMode="auto">
           <a:xfrm>
-            <a:off x="6007895" y="2095068"/>
-            <a:ext cx="2143125" cy="82548"/>
+            <a:off x="6007896" y="1571301"/>
+            <a:ext cx="2143125" cy="61911"/>
           </a:xfrm>
           <a:prstGeom prst="rect">
             <a:avLst/>
@@ -18846,8 +18875,8 @@
         </p:nvGrpSpPr>
         <p:grpSpPr>
           <a:xfrm>
-            <a:off x="5538083" y="2520514"/>
-            <a:ext cx="554831" cy="1209677"/>
+            <a:off x="5538084" y="1890386"/>
+            <a:ext cx="554831" cy="907258"/>
             <a:chOff x="3026569" y="3581399"/>
             <a:chExt cx="554831" cy="907258"/>
           </a:xfrm>
@@ -19196,8 +19225,8 @@
         </p:nvSpPr>
         <p:spPr bwMode="auto">
           <a:xfrm>
-            <a:off x="3539839" y="3422216"/>
-            <a:ext cx="1958975" cy="238124"/>
+            <a:off x="3539840" y="2566662"/>
+            <a:ext cx="1958975" cy="178593"/>
           </a:xfrm>
           <a:prstGeom prst="roundRect">
             <a:avLst>
@@ -19272,8 +19301,8 @@
         </p:nvSpPr>
         <p:spPr bwMode="auto">
           <a:xfrm>
-            <a:off x="3539839" y="3422216"/>
-            <a:ext cx="1958975" cy="238124"/>
+            <a:off x="3539840" y="2566662"/>
+            <a:ext cx="1958975" cy="178593"/>
           </a:xfrm>
           <a:prstGeom prst="roundRect">
             <a:avLst>
@@ -19348,8 +19377,8 @@
         </p:nvSpPr>
         <p:spPr bwMode="auto">
           <a:xfrm>
-            <a:off x="3539839" y="3422216"/>
-            <a:ext cx="1958975" cy="238124"/>
+            <a:off x="3539840" y="2566662"/>
+            <a:ext cx="1958975" cy="178593"/>
           </a:xfrm>
           <a:prstGeom prst="roundRect">
             <a:avLst>
@@ -19680,8 +19709,8 @@
         </p:nvGrpSpPr>
         <p:grpSpPr>
           <a:xfrm>
-            <a:off x="934157" y="2243042"/>
-            <a:ext cx="7279510" cy="1646239"/>
+            <a:off x="934157" y="1682282"/>
+            <a:ext cx="7279510" cy="1234679"/>
             <a:chOff x="929489" y="3268267"/>
             <a:chExt cx="7279510" cy="1234679"/>
           </a:xfrm>
@@ -20522,8 +20551,8 @@
         </p:nvSpPr>
         <p:spPr bwMode="auto">
           <a:xfrm>
-            <a:off x="3595219" y="2381153"/>
-            <a:ext cx="1958975" cy="238124"/>
+            <a:off x="3595220" y="1785865"/>
+            <a:ext cx="1958975" cy="178593"/>
           </a:xfrm>
           <a:prstGeom prst="roundRect">
             <a:avLst>
@@ -20606,8 +20635,8 @@
         </p:nvSpPr>
         <p:spPr bwMode="auto">
           <a:xfrm>
-            <a:off x="3595219" y="2381153"/>
-            <a:ext cx="1958975" cy="238124"/>
+            <a:off x="3595220" y="1785865"/>
+            <a:ext cx="1958975" cy="178593"/>
           </a:xfrm>
           <a:prstGeom prst="roundRect">
             <a:avLst>
@@ -20691,8 +20720,8 @@
         </p:nvSpPr>
         <p:spPr bwMode="auto">
           <a:xfrm>
-            <a:off x="3595219" y="2381153"/>
-            <a:ext cx="1958975" cy="238124"/>
+            <a:off x="3595220" y="1785865"/>
+            <a:ext cx="1958975" cy="178593"/>
           </a:xfrm>
           <a:prstGeom prst="roundRect">
             <a:avLst>
@@ -20779,8 +20808,8 @@
         </p:nvSpPr>
         <p:spPr bwMode="auto">
           <a:xfrm>
-            <a:off x="3595219" y="2381153"/>
-            <a:ext cx="1958975" cy="238124"/>
+            <a:off x="3595220" y="1785865"/>
+            <a:ext cx="1958975" cy="178593"/>
           </a:xfrm>
           <a:prstGeom prst="roundRect">
             <a:avLst>
@@ -20862,11 +20891,7 @@
           <a:p>
             <a:r>
               <a:rPr lang="en-US" dirty="0" smtClean="0"/>
-              <a:t>Partitioned </a:t>
-            </a:r>
-            <a:r>
-              <a:rPr lang="en-US" dirty="0" smtClean="0"/>
-              <a:t>Regions Overview</a:t>
+              <a:t>Partitioned Regions Overview</a:t>
             </a:r>
             <a:endParaRPr lang="en-US" dirty="0"/>
           </a:p>
@@ -20880,8 +20905,8 @@
         </p:nvGrpSpPr>
         <p:grpSpPr>
           <a:xfrm>
-            <a:off x="938825" y="2235105"/>
-            <a:ext cx="7267575" cy="82548"/>
+            <a:off x="938826" y="1676329"/>
+            <a:ext cx="7267575" cy="61911"/>
             <a:chOff x="934156" y="3262314"/>
             <a:chExt cx="7267575" cy="61911"/>
           </a:xfrm>
@@ -21095,8 +21120,8 @@
         </p:nvSpPr>
         <p:spPr bwMode="auto">
           <a:xfrm>
-            <a:off x="1032977" y="3562222"/>
-            <a:ext cx="1958975" cy="238124"/>
+            <a:off x="1032978" y="2671667"/>
+            <a:ext cx="1958975" cy="178593"/>
           </a:xfrm>
           <a:prstGeom prst="roundRect">
             <a:avLst>
@@ -21171,8 +21196,8 @@
         </p:nvSpPr>
         <p:spPr bwMode="auto">
           <a:xfrm>
-            <a:off x="6166968" y="3562258"/>
-            <a:ext cx="1958975" cy="238124"/>
+            <a:off x="6166969" y="2671694"/>
+            <a:ext cx="1958975" cy="178593"/>
           </a:xfrm>
           <a:prstGeom prst="roundRect">
             <a:avLst>
@@ -21247,8 +21272,8 @@
         </p:nvSpPr>
         <p:spPr bwMode="auto">
           <a:xfrm>
-            <a:off x="3595219" y="3562253"/>
-            <a:ext cx="1958975" cy="238124"/>
+            <a:off x="3595220" y="2671690"/>
+            <a:ext cx="1958975" cy="178593"/>
           </a:xfrm>
           <a:prstGeom prst="roundRect">
             <a:avLst>
@@ -21659,8 +21684,8 @@
         </p:nvGrpSpPr>
         <p:grpSpPr>
           <a:xfrm>
-            <a:off x="1033558" y="4357690"/>
-            <a:ext cx="2179730" cy="1646239"/>
+            <a:off x="1033558" y="3268268"/>
+            <a:ext cx="2179730" cy="1234679"/>
             <a:chOff x="1033558" y="2515792"/>
             <a:chExt cx="2179730" cy="1234679"/>
           </a:xfrm>
@@ -21719,7 +21744,7 @@
           <p:spPr bwMode="auto">
             <a:xfrm>
               <a:off x="2669243" y="3519490"/>
-              <a:ext cx="544045" cy="173124"/>
+              <a:ext cx="544045" cy="230832"/>
             </a:xfrm>
             <a:prstGeom prst="rect">
               <a:avLst/>
@@ -21854,8 +21879,8 @@
         </p:nvGrpSpPr>
         <p:grpSpPr>
           <a:xfrm>
-            <a:off x="1022857" y="790577"/>
-            <a:ext cx="2197293" cy="1662113"/>
+            <a:off x="1022858" y="592933"/>
+            <a:ext cx="2197293" cy="1246585"/>
             <a:chOff x="1032382" y="1393032"/>
             <a:chExt cx="2197293" cy="1246585"/>
           </a:xfrm>
@@ -21928,7 +21953,7 @@
             <p:spPr bwMode="auto">
               <a:xfrm>
                 <a:off x="4851350" y="1393032"/>
-                <a:ext cx="813043" cy="173124"/>
+                <a:ext cx="813043" cy="230832"/>
               </a:xfrm>
               <a:prstGeom prst="rect">
                 <a:avLst/>
@@ -22017,8 +22042,8 @@
         </p:nvSpPr>
         <p:spPr>
           <a:xfrm>
-            <a:off x="352244" y="127001"/>
-            <a:ext cx="8410575" cy="613833"/>
+            <a:off x="352245" y="95251"/>
+            <a:ext cx="8410575" cy="460375"/>
           </a:xfrm>
         </p:spPr>
         <p:txBody>
@@ -22027,11 +22052,7 @@
           <a:p>
             <a:r>
               <a:rPr lang="en-US" dirty="0" smtClean="0"/>
-              <a:t>Continuous </a:t>
-            </a:r>
-            <a:r>
-              <a:rPr lang="en-US" dirty="0" smtClean="0"/>
-              <a:t>Queries Overview</a:t>
+              <a:t>Continuous Queries Overview</a:t>
             </a:r>
             <a:endParaRPr lang="en-US" dirty="0"/>
           </a:p>
@@ -22045,8 +22066,8 @@
         </p:nvSpPr>
         <p:spPr>
           <a:xfrm>
-            <a:off x="3353717" y="1315346"/>
-            <a:ext cx="4857751" cy="212722"/>
+            <a:off x="3353718" y="986509"/>
+            <a:ext cx="4857751" cy="159542"/>
           </a:xfrm>
           <a:prstGeom prst="rect">
             <a:avLst/>
@@ -22068,11 +22089,7 @@
             <a:pPr fontAlgn="t"/>
             <a:r>
               <a:rPr lang="en-US" sz="800" b="1" dirty="0" smtClean="0"/>
-              <a:t>String </a:t>
-            </a:r>
-            <a:r>
-              <a:rPr lang="en-US" sz="800" b="1" dirty="0" smtClean="0"/>
-              <a:t>query = “SELECT * FROM /Customers WHERE balance &lt; 0”;</a:t>
+              <a:t>String query = “SELECT * FROM /Customers WHERE balance &lt; 0”;</a:t>
             </a:r>
             <a:r>
               <a:rPr lang="en-US" sz="800" dirty="0" smtClean="0"/>
@@ -22091,8 +22108,8 @@
         </p:nvSpPr>
         <p:spPr bwMode="auto">
           <a:xfrm>
-            <a:off x="1038226" y="4349753"/>
-            <a:ext cx="2143125" cy="342900"/>
+            <a:off x="1038227" y="3262315"/>
+            <a:ext cx="2143125" cy="257175"/>
           </a:xfrm>
           <a:prstGeom prst="rect">
             <a:avLst/>
@@ -22160,8 +22177,8 @@
         </p:nvSpPr>
         <p:spPr bwMode="auto">
           <a:xfrm>
-            <a:off x="1028701" y="2101854"/>
-            <a:ext cx="2143125" cy="342900"/>
+            <a:off x="1028702" y="1576391"/>
+            <a:ext cx="2143125" cy="257175"/>
           </a:xfrm>
           <a:prstGeom prst="rect">
             <a:avLst/>
@@ -22234,8 +22251,8 @@
         </p:nvSpPr>
         <p:spPr bwMode="auto">
           <a:xfrm>
-            <a:off x="1104901" y="1752600"/>
-            <a:ext cx="1123950" cy="263525"/>
+            <a:off x="1104901" y="1314450"/>
+            <a:ext cx="1123950" cy="197644"/>
           </a:xfrm>
           <a:prstGeom prst="roundRect">
             <a:avLst>
@@ -22305,8 +22322,8 @@
         </p:nvGrpSpPr>
         <p:grpSpPr bwMode="auto">
           <a:xfrm>
-            <a:off x="1981201" y="3633788"/>
-            <a:ext cx="158749" cy="766763"/>
+            <a:off x="1981202" y="2725342"/>
+            <a:ext cx="158749" cy="575072"/>
             <a:chOff x="3172" y="2337"/>
             <a:chExt cx="104" cy="483"/>
           </a:xfrm>
@@ -22489,8 +22506,8 @@
         </p:nvGrpSpPr>
         <p:grpSpPr bwMode="auto">
           <a:xfrm>
-            <a:off x="2312988" y="1257301"/>
-            <a:ext cx="792162" cy="419100"/>
+            <a:off x="2312988" y="942976"/>
+            <a:ext cx="792162" cy="314325"/>
             <a:chOff x="2609" y="1358"/>
             <a:chExt cx="443" cy="178"/>
           </a:xfrm>
@@ -22638,8 +22655,8 @@
         </p:nvSpPr>
         <p:spPr bwMode="auto">
           <a:xfrm>
-            <a:off x="357188" y="4876800"/>
-            <a:ext cx="1065210" cy="395291"/>
+            <a:off x="357188" y="3657601"/>
+            <a:ext cx="1065210" cy="296468"/>
           </a:xfrm>
           <a:prstGeom prst="rightArrow">
             <a:avLst/>
@@ -22689,8 +22706,8 @@
         </p:nvCxnSpPr>
         <p:spPr bwMode="auto">
           <a:xfrm rot="5400000" flipH="1" flipV="1">
-            <a:off x="1599406" y="4504532"/>
-            <a:ext cx="552451" cy="344491"/>
+            <a:off x="1668463" y="3335338"/>
+            <a:ext cx="414338" cy="344491"/>
           </a:xfrm>
           <a:prstGeom prst="straightConnector1">
             <a:avLst/>
@@ -22718,8 +22735,8 @@
         </p:nvSpPr>
         <p:spPr bwMode="auto">
           <a:xfrm>
-            <a:off x="1402268" y="5003800"/>
-            <a:ext cx="432883" cy="537633"/>
+            <a:off x="1402269" y="3752850"/>
+            <a:ext cx="432883" cy="403225"/>
           </a:xfrm>
           <a:prstGeom prst="hexagon">
             <a:avLst/>
@@ -22795,8 +22812,8 @@
         </p:nvCxnSpPr>
         <p:spPr bwMode="auto">
           <a:xfrm rot="5400000">
-            <a:off x="1241655" y="2380061"/>
-            <a:ext cx="2082176" cy="425281"/>
+            <a:off x="1501927" y="1731886"/>
+            <a:ext cx="1561632" cy="425281"/>
           </a:xfrm>
           <a:prstGeom prst="straightConnector1">
             <a:avLst/>
@@ -22824,8 +22841,8 @@
         </p:nvSpPr>
         <p:spPr bwMode="auto">
           <a:xfrm>
-            <a:off x="2600273" y="1224757"/>
-            <a:ext cx="599033" cy="801687"/>
+            <a:off x="2600274" y="918568"/>
+            <a:ext cx="599033" cy="601265"/>
           </a:xfrm>
           <a:prstGeom prst="irregularSeal1">
             <a:avLst/>
@@ -22872,10 +22889,10 @@
         </p:nvGrpSpPr>
         <p:grpSpPr>
           <a:xfrm>
-            <a:off x="2669502" y="980201"/>
-            <a:ext cx="1338828" cy="238999"/>
+            <a:off x="2669502" y="735151"/>
+            <a:ext cx="1338828" cy="215444"/>
             <a:chOff x="2669502" y="735151"/>
-            <a:chExt cx="1338828" cy="179249"/>
+            <a:chExt cx="1338828" cy="215444"/>
           </a:xfrm>
         </p:grpSpPr>
         <p:sp>
@@ -22933,7 +22950,7 @@
           <p:spPr>
             <a:xfrm>
               <a:off x="2669502" y="735151"/>
-              <a:ext cx="1338828" cy="161583"/>
+              <a:ext cx="1338828" cy="215444"/>
             </a:xfrm>
             <a:prstGeom prst="rect">
               <a:avLst/>
@@ -23409,8 +23426,8 @@
         </p:nvSpPr>
         <p:spPr>
           <a:xfrm>
-            <a:off x="1017587" y="1917405"/>
-            <a:ext cx="7664757" cy="1230080"/>
+            <a:off x="1017588" y="1739931"/>
+            <a:ext cx="7664757" cy="620683"/>
           </a:xfrm>
         </p:spPr>
         <p:txBody>
@@ -23628,689 +23645,14 @@
       </p:grpSpPr>
       <p:sp>
         <p:nvSpPr>
-          <p:cNvPr id="7" name="Title 6"/>
-          <p:cNvSpPr>
-            <a:spLocks noGrp="1"/>
-          </p:cNvSpPr>
-          <p:nvPr>
-            <p:ph type="title"/>
-          </p:nvPr>
-        </p:nvSpPr>
-        <p:spPr/>
-        <p:txBody>
-          <a:bodyPr/>
-          <a:lstStyle/>
-          <a:p>
-            <a:r>
-              <a:rPr lang="en-US" dirty="0">
-                <a:solidFill>
-                  <a:srgbClr val="1C7B70"/>
-                </a:solidFill>
-              </a:rPr>
-              <a:t>A New Release for Real-Time Data Apps in Pivotal Big Data Suite</a:t>
-            </a:r>
-          </a:p>
-        </p:txBody>
-      </p:sp>
-      <p:grpSp>
-        <p:nvGrpSpPr>
-          <p:cNvPr id="28" name="Group 27"/>
-          <p:cNvGrpSpPr/>
-          <p:nvPr/>
-        </p:nvGrpSpPr>
-        <p:grpSpPr>
-          <a:xfrm>
-            <a:off x="1284098" y="1875032"/>
-            <a:ext cx="6577392" cy="4078541"/>
-            <a:chOff x="675861" y="882359"/>
-            <a:chExt cx="7675320" cy="3569514"/>
-          </a:xfrm>
-        </p:grpSpPr>
-        <p:sp>
-          <p:nvSpPr>
-            <p:cNvPr id="9" name="Rounded Rectangle 8"/>
-            <p:cNvSpPr/>
-            <p:nvPr/>
-          </p:nvSpPr>
-          <p:spPr>
-            <a:xfrm>
-              <a:off x="675861" y="882359"/>
-              <a:ext cx="7670182" cy="675251"/>
-            </a:xfrm>
-            <a:prstGeom prst="roundRect">
-              <a:avLst>
-                <a:gd name="adj" fmla="val 8809"/>
-              </a:avLst>
-            </a:prstGeom>
-            <a:noFill/>
-            <a:ln w="12700">
-              <a:solidFill>
-                <a:srgbClr val="1C7B70"/>
-              </a:solidFill>
-            </a:ln>
-          </p:spPr>
-          <p:style>
-            <a:lnRef idx="2">
-              <a:schemeClr val="accent1">
-                <a:shade val="50000"/>
-              </a:schemeClr>
-            </a:lnRef>
-            <a:fillRef idx="1">
-              <a:schemeClr val="accent1"/>
-            </a:fillRef>
-            <a:effectRef idx="0">
-              <a:schemeClr val="accent1"/>
-            </a:effectRef>
-            <a:fontRef idx="minor">
-              <a:schemeClr val="lt1"/>
-            </a:fontRef>
-          </p:style>
-          <p:txBody>
-            <a:bodyPr rtlCol="0" anchor="ctr"/>
-            <a:lstStyle/>
-            <a:p>
-              <a:pPr algn="ctr"/>
-              <a:r>
-                <a:rPr lang="en-US" sz="2400" dirty="0" smtClean="0">
-                  <a:solidFill>
-                    <a:srgbClr val="1C7B70"/>
-                  </a:solidFill>
-                </a:rPr>
-                <a:t>Pivotal Big Data Suite</a:t>
-              </a:r>
-              <a:endParaRPr lang="en-US" sz="2400" dirty="0">
-                <a:solidFill>
-                  <a:srgbClr val="1C7B70"/>
-                </a:solidFill>
-              </a:endParaRPr>
-            </a:p>
-          </p:txBody>
-        </p:sp>
-        <p:sp>
-          <p:nvSpPr>
-            <p:cNvPr id="10" name="Rounded Rectangle 9"/>
-            <p:cNvSpPr/>
-            <p:nvPr/>
-          </p:nvSpPr>
-          <p:spPr>
-            <a:xfrm>
-              <a:off x="675861" y="1626753"/>
-              <a:ext cx="7675319" cy="895611"/>
-            </a:xfrm>
-            <a:prstGeom prst="roundRect">
-              <a:avLst>
-                <a:gd name="adj" fmla="val 7874"/>
-              </a:avLst>
-            </a:prstGeom>
-            <a:solidFill>
-              <a:srgbClr val="63AEA8"/>
-            </a:solidFill>
-            <a:ln w="12700">
-              <a:solidFill>
-                <a:srgbClr val="1C7B70"/>
-              </a:solidFill>
-            </a:ln>
-          </p:spPr>
-          <p:style>
-            <a:lnRef idx="2">
-              <a:schemeClr val="accent1">
-                <a:shade val="50000"/>
-              </a:schemeClr>
-            </a:lnRef>
-            <a:fillRef idx="1">
-              <a:schemeClr val="accent1"/>
-            </a:fillRef>
-            <a:effectRef idx="0">
-              <a:schemeClr val="accent1"/>
-            </a:effectRef>
-            <a:fontRef idx="minor">
-              <a:schemeClr val="lt1"/>
-            </a:fontRef>
-          </p:style>
-          <p:txBody>
-            <a:bodyPr rtlCol="0" anchor="ctr"/>
-            <a:lstStyle/>
-            <a:p>
-              <a:pPr algn="ctr"/>
-              <a:endParaRPr lang="en-US" sz="1600"/>
-            </a:p>
-          </p:txBody>
-        </p:sp>
-        <p:sp>
-          <p:nvSpPr>
-            <p:cNvPr id="11" name="Rounded Rectangle 10"/>
-            <p:cNvSpPr/>
-            <p:nvPr/>
-          </p:nvSpPr>
-          <p:spPr>
-            <a:xfrm>
-              <a:off x="675861" y="2591508"/>
-              <a:ext cx="7675319" cy="895611"/>
-            </a:xfrm>
-            <a:prstGeom prst="roundRect">
-              <a:avLst>
-                <a:gd name="adj" fmla="val 7874"/>
-              </a:avLst>
-            </a:prstGeom>
-            <a:solidFill>
-              <a:srgbClr val="509891"/>
-            </a:solidFill>
-            <a:ln w="12700">
-              <a:solidFill>
-                <a:srgbClr val="1C7B70"/>
-              </a:solidFill>
-            </a:ln>
-          </p:spPr>
-          <p:style>
-            <a:lnRef idx="2">
-              <a:schemeClr val="accent1">
-                <a:shade val="50000"/>
-              </a:schemeClr>
-            </a:lnRef>
-            <a:fillRef idx="1">
-              <a:schemeClr val="accent1"/>
-            </a:fillRef>
-            <a:effectRef idx="0">
-              <a:schemeClr val="accent1"/>
-            </a:effectRef>
-            <a:fontRef idx="minor">
-              <a:schemeClr val="lt1"/>
-            </a:fontRef>
-          </p:style>
-          <p:txBody>
-            <a:bodyPr rtlCol="0" anchor="ctr"/>
-            <a:lstStyle/>
-            <a:p>
-              <a:pPr algn="ctr"/>
-              <a:endParaRPr lang="en-US" sz="1600"/>
-            </a:p>
-          </p:txBody>
-        </p:sp>
-        <p:sp>
-          <p:nvSpPr>
-            <p:cNvPr id="12" name="Rounded Rectangle 11"/>
-            <p:cNvSpPr/>
-            <p:nvPr/>
-          </p:nvSpPr>
-          <p:spPr>
-            <a:xfrm>
-              <a:off x="675861" y="3556262"/>
-              <a:ext cx="7675319" cy="895611"/>
-            </a:xfrm>
-            <a:prstGeom prst="roundRect">
-              <a:avLst>
-                <a:gd name="adj" fmla="val 7874"/>
-              </a:avLst>
-            </a:prstGeom>
-            <a:solidFill>
-              <a:srgbClr val="24A8CB"/>
-            </a:solidFill>
-            <a:ln w="12700">
-              <a:solidFill>
-                <a:srgbClr val="1C7B70"/>
-              </a:solidFill>
-            </a:ln>
-          </p:spPr>
-          <p:style>
-            <a:lnRef idx="2">
-              <a:schemeClr val="accent1">
-                <a:shade val="50000"/>
-              </a:schemeClr>
-            </a:lnRef>
-            <a:fillRef idx="1">
-              <a:schemeClr val="accent1"/>
-            </a:fillRef>
-            <a:effectRef idx="0">
-              <a:schemeClr val="accent1"/>
-            </a:effectRef>
-            <a:fontRef idx="minor">
-              <a:schemeClr val="lt1"/>
-            </a:fontRef>
-          </p:style>
-          <p:txBody>
-            <a:bodyPr rtlCol="0" anchor="ctr"/>
-            <a:lstStyle/>
-            <a:p>
-              <a:pPr algn="ctr"/>
-              <a:endParaRPr lang="en-US" sz="1600"/>
-            </a:p>
-          </p:txBody>
-        </p:sp>
-        <p:sp>
-          <p:nvSpPr>
-            <p:cNvPr id="15" name="Rounded Rectangle 14"/>
-            <p:cNvSpPr/>
-            <p:nvPr/>
-          </p:nvSpPr>
-          <p:spPr>
-            <a:xfrm>
-              <a:off x="4513520" y="2644083"/>
-              <a:ext cx="2000625" cy="790459"/>
-            </a:xfrm>
-            <a:prstGeom prst="roundRect">
-              <a:avLst>
-                <a:gd name="adj" fmla="val 6829"/>
-              </a:avLst>
-            </a:prstGeom>
-            <a:solidFill>
-              <a:srgbClr val="0392CB"/>
-            </a:solidFill>
-            <a:ln w="12700">
-              <a:solidFill>
-                <a:schemeClr val="bg1"/>
-              </a:solidFill>
-            </a:ln>
-          </p:spPr>
-          <p:style>
-            <a:lnRef idx="2">
-              <a:schemeClr val="accent1">
-                <a:shade val="50000"/>
-              </a:schemeClr>
-            </a:lnRef>
-            <a:fillRef idx="1">
-              <a:schemeClr val="accent1"/>
-            </a:fillRef>
-            <a:effectRef idx="0">
-              <a:schemeClr val="accent1"/>
-            </a:effectRef>
-            <a:fontRef idx="minor">
-              <a:schemeClr val="lt1"/>
-            </a:fontRef>
-          </p:style>
-          <p:txBody>
-            <a:bodyPr rtlCol="0" anchor="ctr"/>
-            <a:lstStyle/>
-            <a:p>
-              <a:pPr algn="ctr"/>
-              <a:r>
-                <a:rPr lang="en-US" sz="1600" dirty="0" smtClean="0"/>
-                <a:t>HAWQ</a:t>
-              </a:r>
-              <a:endParaRPr lang="en-US" sz="1600" dirty="0"/>
-            </a:p>
-          </p:txBody>
-        </p:sp>
-        <p:sp>
-          <p:nvSpPr>
-            <p:cNvPr id="16" name="Rounded Rectangle 15"/>
-            <p:cNvSpPr/>
-            <p:nvPr/>
-          </p:nvSpPr>
-          <p:spPr>
-            <a:xfrm>
-              <a:off x="2512896" y="3608837"/>
-              <a:ext cx="4001250" cy="790459"/>
-            </a:xfrm>
-            <a:prstGeom prst="roundRect">
-              <a:avLst>
-                <a:gd name="adj" fmla="val 6829"/>
-              </a:avLst>
-            </a:prstGeom>
-            <a:solidFill>
-              <a:srgbClr val="0392CB"/>
-            </a:solidFill>
-            <a:ln w="12700">
-              <a:solidFill>
-                <a:schemeClr val="bg1"/>
-              </a:solidFill>
-            </a:ln>
-          </p:spPr>
-          <p:style>
-            <a:lnRef idx="2">
-              <a:schemeClr val="accent1">
-                <a:shade val="50000"/>
-              </a:schemeClr>
-            </a:lnRef>
-            <a:fillRef idx="1">
-              <a:schemeClr val="accent1"/>
-            </a:fillRef>
-            <a:effectRef idx="0">
-              <a:schemeClr val="accent1"/>
-            </a:effectRef>
-            <a:fontRef idx="minor">
-              <a:schemeClr val="lt1"/>
-            </a:fontRef>
-          </p:style>
-          <p:txBody>
-            <a:bodyPr rtlCol="0" anchor="ctr"/>
-            <a:lstStyle/>
-            <a:p>
-              <a:pPr algn="ctr"/>
-              <a:r>
-                <a:rPr lang="en-US" sz="1600" dirty="0" smtClean="0"/>
-                <a:t>Unlimited Pivotal HD</a:t>
-              </a:r>
-              <a:endParaRPr lang="en-US" sz="1600" dirty="0"/>
-            </a:p>
-          </p:txBody>
-        </p:sp>
-        <p:sp>
-          <p:nvSpPr>
-            <p:cNvPr id="17" name="Rounded Rectangle 16"/>
-            <p:cNvSpPr/>
-            <p:nvPr/>
-          </p:nvSpPr>
-          <p:spPr>
-            <a:xfrm>
-              <a:off x="2512895" y="1674565"/>
-              <a:ext cx="4002303" cy="790459"/>
-            </a:xfrm>
-            <a:prstGeom prst="roundRect">
-              <a:avLst>
-                <a:gd name="adj" fmla="val 6829"/>
-              </a:avLst>
-            </a:prstGeom>
-            <a:solidFill>
-              <a:srgbClr val="03786E"/>
-            </a:solidFill>
-            <a:ln w="12700">
-              <a:solidFill>
-                <a:schemeClr val="bg1"/>
-              </a:solidFill>
-            </a:ln>
-          </p:spPr>
-          <p:style>
-            <a:lnRef idx="2">
-              <a:schemeClr val="accent1">
-                <a:shade val="50000"/>
-              </a:schemeClr>
-            </a:lnRef>
-            <a:fillRef idx="1">
-              <a:schemeClr val="accent1"/>
-            </a:fillRef>
-            <a:effectRef idx="0">
-              <a:schemeClr val="accent1"/>
-            </a:effectRef>
-            <a:fontRef idx="minor">
-              <a:schemeClr val="lt1"/>
-            </a:fontRef>
-          </p:style>
-          <p:txBody>
-            <a:bodyPr rtlCol="0" anchor="ctr"/>
-            <a:lstStyle/>
-            <a:p>
-              <a:pPr algn="ctr"/>
-              <a:r>
-                <a:rPr lang="en-US" sz="1600" dirty="0" smtClean="0"/>
-                <a:t>GemFire</a:t>
-              </a:r>
-              <a:endParaRPr lang="en-US" sz="1600" dirty="0"/>
-            </a:p>
-          </p:txBody>
-        </p:sp>
-        <p:sp>
-          <p:nvSpPr>
-            <p:cNvPr id="18" name="Rounded Rectangle 17"/>
-            <p:cNvSpPr/>
-            <p:nvPr/>
-          </p:nvSpPr>
-          <p:spPr>
-            <a:xfrm>
-              <a:off x="2512895" y="2644082"/>
-              <a:ext cx="2000625" cy="790459"/>
-            </a:xfrm>
-            <a:prstGeom prst="roundRect">
-              <a:avLst>
-                <a:gd name="adj" fmla="val 6829"/>
-              </a:avLst>
-            </a:prstGeom>
-            <a:solidFill>
-              <a:srgbClr val="03786E"/>
-            </a:solidFill>
-            <a:ln w="12700">
-              <a:solidFill>
-                <a:schemeClr val="bg1"/>
-              </a:solidFill>
-            </a:ln>
-          </p:spPr>
-          <p:style>
-            <a:lnRef idx="2">
-              <a:schemeClr val="accent1">
-                <a:shade val="50000"/>
-              </a:schemeClr>
-            </a:lnRef>
-            <a:fillRef idx="1">
-              <a:schemeClr val="accent1"/>
-            </a:fillRef>
-            <a:effectRef idx="0">
-              <a:schemeClr val="accent1"/>
-            </a:effectRef>
-            <a:fontRef idx="minor">
-              <a:schemeClr val="lt1"/>
-            </a:fontRef>
-          </p:style>
-          <p:txBody>
-            <a:bodyPr rtlCol="0" anchor="ctr"/>
-            <a:lstStyle/>
-            <a:p>
-              <a:pPr algn="ctr"/>
-              <a:r>
-                <a:rPr lang="en-US" sz="1600" dirty="0" err="1" smtClean="0"/>
-                <a:t>Greenplum</a:t>
-              </a:r>
-              <a:r>
-                <a:rPr lang="en-US" sz="1600" dirty="0" smtClean="0"/>
-                <a:t> Database</a:t>
-              </a:r>
-              <a:endParaRPr lang="en-US" sz="1600" dirty="0"/>
-            </a:p>
-          </p:txBody>
-        </p:sp>
-        <p:sp>
-          <p:nvSpPr>
-            <p:cNvPr id="19" name="TextBox 18"/>
-            <p:cNvSpPr txBox="1"/>
-            <p:nvPr/>
-          </p:nvSpPr>
-          <p:spPr>
-            <a:xfrm>
-              <a:off x="680998" y="1885127"/>
-              <a:ext cx="1831896" cy="296300"/>
-            </a:xfrm>
-            <a:prstGeom prst="rect">
-              <a:avLst/>
-            </a:prstGeom>
-            <a:noFill/>
-          </p:spPr>
-          <p:txBody>
-            <a:bodyPr wrap="square" rtlCol="0">
-              <a:spAutoFit/>
-            </a:bodyPr>
-            <a:lstStyle/>
-            <a:p>
-              <a:pPr algn="ctr"/>
-              <a:r>
-                <a:rPr lang="en-US" sz="1600" dirty="0" smtClean="0">
-                  <a:solidFill>
-                    <a:schemeClr val="bg1"/>
-                  </a:solidFill>
-                </a:rPr>
-                <a:t>REAL-TIME</a:t>
-              </a:r>
-            </a:p>
-          </p:txBody>
-        </p:sp>
-        <p:sp>
-          <p:nvSpPr>
-            <p:cNvPr id="21" name="TextBox 20"/>
-            <p:cNvSpPr txBox="1"/>
-            <p:nvPr/>
-          </p:nvSpPr>
-          <p:spPr>
-            <a:xfrm>
-              <a:off x="680999" y="2854646"/>
-              <a:ext cx="1831896" cy="296300"/>
-            </a:xfrm>
-            <a:prstGeom prst="rect">
-              <a:avLst/>
-            </a:prstGeom>
-            <a:noFill/>
-          </p:spPr>
-          <p:txBody>
-            <a:bodyPr wrap="square" rtlCol="0">
-              <a:spAutoFit/>
-            </a:bodyPr>
-            <a:lstStyle/>
-            <a:p>
-              <a:pPr algn="ctr"/>
-              <a:r>
-                <a:rPr lang="en-US" sz="1600" dirty="0" smtClean="0">
-                  <a:solidFill>
-                    <a:schemeClr val="bg1"/>
-                  </a:solidFill>
-                </a:rPr>
-                <a:t>INTERACTIVE</a:t>
-              </a:r>
-            </a:p>
-          </p:txBody>
-        </p:sp>
-        <p:sp>
-          <p:nvSpPr>
-            <p:cNvPr id="22" name="TextBox 21"/>
-            <p:cNvSpPr txBox="1"/>
-            <p:nvPr/>
-          </p:nvSpPr>
-          <p:spPr>
-            <a:xfrm>
-              <a:off x="675861" y="3819400"/>
-              <a:ext cx="1831896" cy="296300"/>
-            </a:xfrm>
-            <a:prstGeom prst="rect">
-              <a:avLst/>
-            </a:prstGeom>
-            <a:noFill/>
-          </p:spPr>
-          <p:txBody>
-            <a:bodyPr wrap="square" rtlCol="0">
-              <a:spAutoFit/>
-            </a:bodyPr>
-            <a:lstStyle/>
-            <a:p>
-              <a:pPr algn="ctr"/>
-              <a:r>
-                <a:rPr lang="en-US" sz="1600" dirty="0" smtClean="0">
-                  <a:solidFill>
-                    <a:schemeClr val="bg1"/>
-                  </a:solidFill>
-                </a:rPr>
-                <a:t>BATCH</a:t>
-              </a:r>
-            </a:p>
-          </p:txBody>
-        </p:sp>
-        <p:sp>
-          <p:nvSpPr>
-            <p:cNvPr id="23" name="TextBox 22"/>
-            <p:cNvSpPr txBox="1"/>
-            <p:nvPr/>
-          </p:nvSpPr>
-          <p:spPr>
-            <a:xfrm>
-              <a:off x="6519283" y="1885128"/>
-              <a:ext cx="1831896" cy="296300"/>
-            </a:xfrm>
-            <a:prstGeom prst="rect">
-              <a:avLst/>
-            </a:prstGeom>
-            <a:noFill/>
-          </p:spPr>
-          <p:txBody>
-            <a:bodyPr wrap="square" rtlCol="0">
-              <a:spAutoFit/>
-            </a:bodyPr>
-            <a:lstStyle/>
-            <a:p>
-              <a:pPr algn="ctr"/>
-              <a:r>
-                <a:rPr lang="en-US" sz="1600" dirty="0" smtClean="0">
-                  <a:solidFill>
-                    <a:schemeClr val="bg1"/>
-                  </a:solidFill>
-                </a:rPr>
-                <a:t>REAL-TIME</a:t>
-              </a:r>
-            </a:p>
-          </p:txBody>
-        </p:sp>
-        <p:sp>
-          <p:nvSpPr>
-            <p:cNvPr id="24" name="TextBox 23"/>
-            <p:cNvSpPr txBox="1"/>
-            <p:nvPr/>
-          </p:nvSpPr>
-          <p:spPr>
-            <a:xfrm>
-              <a:off x="6519285" y="2854646"/>
-              <a:ext cx="1831896" cy="296300"/>
-            </a:xfrm>
-            <a:prstGeom prst="rect">
-              <a:avLst/>
-            </a:prstGeom>
-            <a:noFill/>
-          </p:spPr>
-          <p:txBody>
-            <a:bodyPr wrap="square" rtlCol="0">
-              <a:spAutoFit/>
-            </a:bodyPr>
-            <a:lstStyle/>
-            <a:p>
-              <a:pPr algn="ctr"/>
-              <a:r>
-                <a:rPr lang="en-US" sz="1600" dirty="0" smtClean="0">
-                  <a:solidFill>
-                    <a:schemeClr val="bg1"/>
-                  </a:solidFill>
-                </a:rPr>
-                <a:t>INTERACTIVE</a:t>
-              </a:r>
-            </a:p>
-          </p:txBody>
-        </p:sp>
-        <p:sp>
-          <p:nvSpPr>
-            <p:cNvPr id="25" name="TextBox 24"/>
-            <p:cNvSpPr txBox="1"/>
-            <p:nvPr/>
-          </p:nvSpPr>
-          <p:spPr>
-            <a:xfrm>
-              <a:off x="6514147" y="3819401"/>
-              <a:ext cx="1831896" cy="296300"/>
-            </a:xfrm>
-            <a:prstGeom prst="rect">
-              <a:avLst/>
-            </a:prstGeom>
-            <a:noFill/>
-          </p:spPr>
-          <p:txBody>
-            <a:bodyPr wrap="square" rtlCol="0">
-              <a:spAutoFit/>
-            </a:bodyPr>
-            <a:lstStyle/>
-            <a:p>
-              <a:pPr algn="ctr"/>
-              <a:r>
-                <a:rPr lang="en-US" sz="1600" dirty="0" smtClean="0">
-                  <a:solidFill>
-                    <a:schemeClr val="bg1"/>
-                  </a:solidFill>
-                </a:rPr>
-                <a:t>BATCH</a:t>
-              </a:r>
-            </a:p>
-          </p:txBody>
-        </p:sp>
-      </p:grpSp>
-      <p:sp>
-        <p:nvSpPr>
           <p:cNvPr id="30" name="Rectangle 29"/>
           <p:cNvSpPr/>
           <p:nvPr/>
         </p:nvSpPr>
         <p:spPr>
           <a:xfrm>
-            <a:off x="326540" y="3801970"/>
-            <a:ext cx="8418512" cy="2228444"/>
+            <a:off x="326540" y="2851478"/>
+            <a:ext cx="8418512" cy="1671333"/>
           </a:xfrm>
           <a:prstGeom prst="rect">
             <a:avLst/>
@@ -24322,6 +23664,85 @@
           </a:solidFill>
           <a:ln w="12700">
             <a:noFill/>
+          </a:ln>
+        </p:spPr>
+        <p:style>
+          <a:lnRef idx="2">
+            <a:schemeClr val="accent1">
+              <a:shade val="50000"/>
+            </a:schemeClr>
+          </a:lnRef>
+          <a:fillRef idx="1">
+            <a:schemeClr val="accent1"/>
+          </a:fillRef>
+          <a:effectRef idx="0">
+            <a:schemeClr val="accent1"/>
+          </a:effectRef>
+          <a:fontRef idx="minor">
+            <a:schemeClr val="lt1"/>
+          </a:fontRef>
+        </p:style>
+        <p:txBody>
+          <a:bodyPr rtlCol="0" anchor="ctr"/>
+          <a:lstStyle/>
+          <a:p>
+            <a:pPr algn="ctr"/>
+            <a:endParaRPr lang="en-US"/>
+          </a:p>
+        </p:txBody>
+      </p:sp>
+      <p:pic>
+        <p:nvPicPr>
+          <p:cNvPr id="20" name="Picture 19" descr="BD_MarketecturePP_White.png"/>
+          <p:cNvPicPr>
+            <a:picLocks noChangeAspect="1"/>
+          </p:cNvPicPr>
+          <p:nvPr/>
+        </p:nvPicPr>
+        <p:blipFill>
+          <a:blip r:embed="rId3">
+            <a:extLst>
+              <a:ext uri="{28A0092B-C50C-407E-A947-70E740481C1C}">
+                <a14:useLocalDpi xmlns:a14="http://schemas.microsoft.com/office/drawing/2010/main" val="0"/>
+              </a:ext>
+            </a:extLst>
+          </a:blip>
+          <a:stretch>
+            <a:fillRect/>
+          </a:stretch>
+        </p:blipFill>
+        <p:spPr>
+          <a:xfrm>
+            <a:off x="705882" y="-101600"/>
+            <a:ext cx="7505565" cy="4861559"/>
+          </a:xfrm>
+          <a:prstGeom prst="rect">
+            <a:avLst/>
+          </a:prstGeom>
+        </p:spPr>
+      </p:pic>
+      <p:sp>
+        <p:nvSpPr>
+          <p:cNvPr id="3" name="Rectangle 2"/>
+          <p:cNvSpPr/>
+          <p:nvPr/>
+        </p:nvSpPr>
+        <p:spPr>
+          <a:xfrm>
+            <a:off x="6206604" y="735298"/>
+            <a:ext cx="1021703" cy="763945"/>
+          </a:xfrm>
+          <a:prstGeom prst="rect">
+            <a:avLst/>
+          </a:prstGeom>
+          <a:noFill/>
+          <a:ln w="31750">
+            <a:solidFill>
+              <a:schemeClr val="tx2">
+                <a:lumMod val="75000"/>
+              </a:schemeClr>
+            </a:solidFill>
+            <a:prstDash val="dash"/>
           </a:ln>
         </p:spPr>
         <p:style>
@@ -24365,9 +23786,88 @@
   <p:timing>
     <p:tnLst>
       <p:par>
-        <p:cTn xmlns:p14="http://schemas.microsoft.com/office/powerpoint/2010/main" id="1" dur="indefinite" restart="never" nodeType="tmRoot"/>
+        <p:cTn xmlns:p14="http://schemas.microsoft.com/office/powerpoint/2010/main" id="1" dur="indefinite" restart="never" nodeType="tmRoot">
+          <p:childTnLst>
+            <p:seq concurrent="1" nextAc="seek">
+              <p:cTn id="2" dur="indefinite" nodeType="mainSeq">
+                <p:childTnLst>
+                  <p:par>
+                    <p:cTn id="3" fill="hold">
+                      <p:stCondLst>
+                        <p:cond delay="indefinite"/>
+                      </p:stCondLst>
+                      <p:childTnLst>
+                        <p:par>
+                          <p:cTn id="4" fill="hold">
+                            <p:stCondLst>
+                              <p:cond delay="0"/>
+                            </p:stCondLst>
+                            <p:childTnLst>
+                              <p:par>
+                                <p:cTn id="5" presetID="9" presetClass="entr" presetSubtype="0" fill="hold" grpId="0" nodeType="clickEffect">
+                                  <p:stCondLst>
+                                    <p:cond delay="0"/>
+                                  </p:stCondLst>
+                                  <p:childTnLst>
+                                    <p:set>
+                                      <p:cBhvr>
+                                        <p:cTn id="6" dur="1" fill="hold">
+                                          <p:stCondLst>
+                                            <p:cond delay="0"/>
+                                          </p:stCondLst>
+                                        </p:cTn>
+                                        <p:tgtEl>
+                                          <p:spTgt spid="3"/>
+                                        </p:tgtEl>
+                                        <p:attrNameLst>
+                                          <p:attrName>style.visibility</p:attrName>
+                                        </p:attrNameLst>
+                                      </p:cBhvr>
+                                      <p:to>
+                                        <p:strVal val="visible"/>
+                                      </p:to>
+                                    </p:set>
+                                    <p:animEffect transition="in" filter="dissolve">
+                                      <p:cBhvr>
+                                        <p:cTn id="7" dur="500"/>
+                                        <p:tgtEl>
+                                          <p:spTgt spid="3"/>
+                                        </p:tgtEl>
+                                      </p:cBhvr>
+                                    </p:animEffect>
+                                  </p:childTnLst>
+                                </p:cTn>
+                              </p:par>
+                            </p:childTnLst>
+                          </p:cTn>
+                        </p:par>
+                      </p:childTnLst>
+                    </p:cTn>
+                  </p:par>
+                </p:childTnLst>
+              </p:cTn>
+              <p:prevCondLst>
+                <p:cond evt="onPrev" delay="0">
+                  <p:tgtEl>
+                    <p:sldTgt/>
+                  </p:tgtEl>
+                </p:cond>
+              </p:prevCondLst>
+              <p:nextCondLst>
+                <p:cond evt="onNext" delay="0">
+                  <p:tgtEl>
+                    <p:sldTgt/>
+                  </p:tgtEl>
+                </p:cond>
+              </p:nextCondLst>
+            </p:seq>
+          </p:childTnLst>
+        </p:cTn>
       </p:par>
     </p:tnLst>
+    <p:bldLst>
+      <p:bldP spid="3" grpId="0" animBg="1"/>
+    </p:bldLst>
   </p:timing>
 </p:sld>
 </file>
@@ -24436,8 +23936,8 @@
         </p:blipFill>
         <p:spPr>
           <a:xfrm>
-            <a:off x="366714" y="1047751"/>
-            <a:ext cx="7628794" cy="4673706"/>
+            <a:off x="366714" y="785813"/>
+            <a:ext cx="7628794" cy="3505280"/>
           </a:xfrm>
           <a:prstGeom prst="rect">
             <a:avLst/>
@@ -24462,7 +23962,7 @@
         </p:nvSpPr>
         <p:spPr>
           <a:xfrm>
-            <a:off x="315739" y="956215"/>
+            <a:off x="315739" y="717162"/>
             <a:ext cx="8461550" cy="4154983"/>
           </a:xfrm>
           <a:prstGeom prst="rect">
@@ -24750,8 +24250,8 @@
         </p:blipFill>
         <p:spPr>
           <a:xfrm>
-            <a:off x="206401" y="5795734"/>
-            <a:ext cx="985802" cy="359114"/>
+            <a:off x="206401" y="4346800"/>
+            <a:ext cx="985802" cy="269336"/>
           </a:xfrm>
           <a:prstGeom prst="rect">
             <a:avLst/>
@@ -24766,7 +24266,7 @@
         </p:nvSpPr>
         <p:spPr>
           <a:xfrm>
-            <a:off x="1295931" y="5861361"/>
+            <a:off x="1295931" y="4396021"/>
             <a:ext cx="7736300" cy="261610"/>
           </a:xfrm>
           <a:prstGeom prst="rect">
@@ -24907,6 +24407,76 @@
                                   </p:childTnLst>
                                 </p:cTn>
                               </p:par>
+                              <p:par>
+                                <p:cTn id="8" presetID="9" presetClass="exit" presetSubtype="0" fill="hold" grpId="0" nodeType="withEffect">
+                                  <p:stCondLst>
+                                    <p:cond delay="0"/>
+                                  </p:stCondLst>
+                                  <p:childTnLst>
+                                    <p:animEffect transition="out" filter="dissolve">
+                                      <p:cBhvr>
+                                        <p:cTn id="9" dur="500"/>
+                                        <p:tgtEl>
+                                          <p:spTgt spid="7"/>
+                                        </p:tgtEl>
+                                      </p:cBhvr>
+                                    </p:animEffect>
+                                    <p:set>
+                                      <p:cBhvr>
+                                        <p:cTn id="10" dur="1" fill="hold">
+                                          <p:stCondLst>
+                                            <p:cond delay="499"/>
+                                          </p:stCondLst>
+                                        </p:cTn>
+                                        <p:tgtEl>
+                                          <p:spTgt spid="7"/>
+                                        </p:tgtEl>
+                                        <p:attrNameLst>
+                                          <p:attrName>style.visibility</p:attrName>
+                                        </p:attrNameLst>
+                                      </p:cBhvr>
+                                      <p:to>
+                                        <p:strVal val="hidden"/>
+                                      </p:to>
+                                    </p:set>
+                                  </p:childTnLst>
+                                </p:cTn>
+                              </p:par>
+                              <p:par>
+                                <p:cTn id="11" presetID="9" presetClass="exit" presetSubtype="0" fill="hold" nodeType="withEffect">
+                                  <p:stCondLst>
+                                    <p:cond delay="0"/>
+                                  </p:stCondLst>
+                                  <p:childTnLst>
+                                    <p:animEffect transition="out" filter="dissolve">
+                                      <p:cBhvr>
+                                        <p:cTn id="12" dur="500"/>
+                                        <p:tgtEl>
+                                          <p:spTgt spid="6"/>
+                                        </p:tgtEl>
+                                      </p:cBhvr>
+                                    </p:animEffect>
+                                    <p:set>
+                                      <p:cBhvr>
+                                        <p:cTn id="13" dur="1" fill="hold">
+                                          <p:stCondLst>
+                                            <p:cond delay="499"/>
+                                          </p:stCondLst>
+                                        </p:cTn>
+                                        <p:tgtEl>
+                                          <p:spTgt spid="6"/>
+                                        </p:tgtEl>
+                                        <p:attrNameLst>
+                                          <p:attrName>style.visibility</p:attrName>
+                                        </p:attrNameLst>
+                                      </p:cBhvr>
+                                      <p:to>
+                                        <p:strVal val="hidden"/>
+                                      </p:to>
+                                    </p:set>
+                                  </p:childTnLst>
+                                </p:cTn>
+                              </p:par>
                             </p:childTnLst>
                           </p:cTn>
                         </p:par>
@@ -24914,26 +24484,26 @@
                     </p:cTn>
                   </p:par>
                   <p:par>
-                    <p:cTn id="8" fill="hold">
+                    <p:cTn id="14" fill="hold">
                       <p:stCondLst>
                         <p:cond delay="indefinite"/>
                       </p:stCondLst>
                       <p:childTnLst>
                         <p:par>
-                          <p:cTn id="9" fill="hold">
+                          <p:cTn id="15" fill="hold">
                             <p:stCondLst>
                               <p:cond delay="0"/>
                             </p:stCondLst>
                             <p:childTnLst>
                               <p:par>
-                                <p:cTn id="10" presetID="9" presetClass="entr" presetSubtype="0" fill="hold" grpId="0" nodeType="clickEffect">
+                                <p:cTn id="16" presetID="9" presetClass="entr" presetSubtype="0" fill="hold" grpId="0" nodeType="clickEffect">
                                   <p:stCondLst>
                                     <p:cond delay="0"/>
                                   </p:stCondLst>
                                   <p:childTnLst>
                                     <p:set>
                                       <p:cBhvr>
-                                        <p:cTn id="11" dur="1" fill="hold">
+                                        <p:cTn id="17" dur="1" fill="hold">
                                           <p:stCondLst>
                                             <p:cond delay="0"/>
                                           </p:stCondLst>
@@ -24951,7 +24521,7 @@
                                     </p:set>
                                     <p:animEffect transition="in" filter="dissolve">
                                       <p:cBhvr>
-                                        <p:cTn id="12" dur="500"/>
+                                        <p:cTn id="18" dur="500"/>
                                         <p:tgtEl>
                                           <p:spTgt spid="5"/>
                                         </p:tgtEl>
@@ -24989,6 +24559,7 @@
     </p:tnLst>
     <p:bldLst>
       <p:bldP spid="5" grpId="0"/>
+      <p:bldP spid="7" grpId="0"/>
     </p:bldLst>
   </p:timing>
 </p:sld>
@@ -25046,8 +24617,8 @@
         </p:nvSpPr>
         <p:spPr>
           <a:xfrm>
-            <a:off x="587013" y="1225657"/>
-            <a:ext cx="8410575" cy="4510616"/>
+            <a:off x="587014" y="919243"/>
+            <a:ext cx="8410575" cy="3382962"/>
           </a:xfrm>
         </p:spPr>
         <p:txBody>
@@ -25246,8 +24817,8 @@
         </p:blipFill>
         <p:spPr>
           <a:xfrm>
-            <a:off x="5532047" y="1428751"/>
-            <a:ext cx="469900" cy="711200"/>
+            <a:off x="5532047" y="1071563"/>
+            <a:ext cx="469900" cy="533400"/>
           </a:xfrm>
           <a:prstGeom prst="rect">
             <a:avLst/>
@@ -25267,8 +24838,8 @@
         </p:nvSpPr>
         <p:spPr bwMode="gray">
           <a:xfrm>
-            <a:off x="6083853" y="1434212"/>
-            <a:ext cx="2698195" cy="705739"/>
+            <a:off x="6083854" y="1075660"/>
+            <a:ext cx="2698195" cy="529304"/>
           </a:xfrm>
           <a:prstGeom prst="rect">
             <a:avLst/>
@@ -25316,7 +24887,7 @@
         </p:nvSpPr>
         <p:spPr>
           <a:xfrm>
-            <a:off x="5513388" y="2347357"/>
+            <a:off x="5513388" y="1760518"/>
             <a:ext cx="3268660" cy="2677656"/>
           </a:xfrm>
           <a:prstGeom prst="rect">
@@ -25553,8 +25124,8 @@
         </p:nvSpPr>
         <p:spPr>
           <a:xfrm>
-            <a:off x="358897" y="1434211"/>
-            <a:ext cx="4695479" cy="1341120"/>
+            <a:off x="358898" y="1075658"/>
+            <a:ext cx="4695479" cy="1005840"/>
           </a:xfrm>
           <a:prstGeom prst="roundRect">
             <a:avLst>
@@ -25606,8 +25177,8 @@
         </p:nvGrpSpPr>
         <p:grpSpPr>
           <a:xfrm>
-            <a:off x="3643301" y="1577805"/>
-            <a:ext cx="1280432" cy="1053935"/>
+            <a:off x="3643301" y="1183354"/>
+            <a:ext cx="1280432" cy="790451"/>
             <a:chOff x="3802325" y="1281990"/>
             <a:chExt cx="1280432" cy="790451"/>
           </a:xfrm>
@@ -25703,8 +25274,8 @@
         </p:nvSpPr>
         <p:spPr>
           <a:xfrm>
-            <a:off x="357474" y="4542931"/>
-            <a:ext cx="4695479" cy="1341120"/>
+            <a:off x="357475" y="3407198"/>
+            <a:ext cx="4695479" cy="1005840"/>
           </a:xfrm>
           <a:prstGeom prst="roundRect">
             <a:avLst>
@@ -25766,8 +25337,8 @@
         </p:nvGrpSpPr>
         <p:grpSpPr>
           <a:xfrm>
-            <a:off x="2632996" y="4934825"/>
-            <a:ext cx="2204584" cy="557331"/>
+            <a:off x="2632996" y="3701119"/>
+            <a:ext cx="2204584" cy="417998"/>
             <a:chOff x="2792020" y="3761910"/>
             <a:chExt cx="2204584" cy="417998"/>
           </a:xfrm>
@@ -26459,8 +26030,8 @@
         </p:nvSpPr>
         <p:spPr>
           <a:xfrm>
-            <a:off x="363539" y="2978531"/>
-            <a:ext cx="4695479" cy="1341120"/>
+            <a:off x="363540" y="2233898"/>
+            <a:ext cx="4695479" cy="1005840"/>
           </a:xfrm>
           <a:prstGeom prst="roundRect">
             <a:avLst>
@@ -26516,10 +26087,10 @@
         </p:nvGrpSpPr>
         <p:grpSpPr>
           <a:xfrm>
-            <a:off x="3922294" y="3127516"/>
-            <a:ext cx="952434" cy="1116534"/>
+            <a:off x="3922294" y="2345637"/>
+            <a:ext cx="952434" cy="877797"/>
             <a:chOff x="3643497" y="2345636"/>
-            <a:chExt cx="952434" cy="837400"/>
+            <a:chExt cx="952434" cy="877796"/>
           </a:xfrm>
         </p:grpSpPr>
         <p:sp>
@@ -26577,7 +26148,7 @@
           <p:spPr>
             <a:xfrm>
               <a:off x="3845968" y="3061849"/>
-              <a:ext cx="665365" cy="121187"/>
+              <a:ext cx="665365" cy="161583"/>
             </a:xfrm>
             <a:prstGeom prst="rect">
               <a:avLst/>
@@ -26680,7 +26251,7 @@
         </p:nvCxnSpPr>
         <p:spPr>
           <a:xfrm>
-            <a:off x="5513388" y="4609191"/>
+            <a:off x="5513388" y="3456893"/>
             <a:ext cx="3268660" cy="0"/>
           </a:xfrm>
           <a:prstGeom prst="line">
@@ -26759,8 +26330,8 @@
         </p:nvSpPr>
         <p:spPr>
           <a:xfrm>
-            <a:off x="366714" y="125771"/>
-            <a:ext cx="8410575" cy="613833"/>
+            <a:off x="366715" y="94328"/>
+            <a:ext cx="8410575" cy="460375"/>
           </a:xfrm>
         </p:spPr>
         <p:txBody>
@@ -26790,8 +26361,8 @@
         </p:nvSpPr>
         <p:spPr>
           <a:xfrm>
-            <a:off x="363539" y="4930501"/>
-            <a:ext cx="4695479" cy="1036235"/>
+            <a:off x="363540" y="3697876"/>
+            <a:ext cx="4695479" cy="777176"/>
           </a:xfrm>
           <a:prstGeom prst="roundRect">
             <a:avLst>
@@ -26843,8 +26414,8 @@
         </p:nvSpPr>
         <p:spPr>
           <a:xfrm>
-            <a:off x="358897" y="1431671"/>
-            <a:ext cx="4695479" cy="1036235"/>
+            <a:off x="358898" y="1073754"/>
+            <a:ext cx="4695479" cy="777176"/>
           </a:xfrm>
           <a:prstGeom prst="roundRect">
             <a:avLst>
@@ -26902,8 +26473,8 @@
         </p:nvGrpSpPr>
         <p:grpSpPr>
           <a:xfrm>
-            <a:off x="3070641" y="1566233"/>
-            <a:ext cx="1783154" cy="823067"/>
+            <a:off x="3070641" y="1174675"/>
+            <a:ext cx="1783154" cy="617300"/>
             <a:chOff x="3070641" y="1335606"/>
             <a:chExt cx="1783154" cy="617300"/>
           </a:xfrm>
@@ -27645,8 +27216,8 @@
         </p:nvSpPr>
         <p:spPr>
           <a:xfrm>
-            <a:off x="363539" y="2597948"/>
-            <a:ext cx="4695479" cy="1036235"/>
+            <a:off x="363540" y="1948462"/>
+            <a:ext cx="4695479" cy="777176"/>
           </a:xfrm>
           <a:prstGeom prst="roundRect">
             <a:avLst>
@@ -27704,10 +27275,10 @@
         </p:nvGrpSpPr>
         <p:grpSpPr>
           <a:xfrm>
-            <a:off x="2430693" y="2785376"/>
-            <a:ext cx="2660196" cy="618336"/>
+            <a:off x="2430693" y="2089032"/>
+            <a:ext cx="2660196" cy="527231"/>
             <a:chOff x="2430693" y="2089032"/>
-            <a:chExt cx="2660196" cy="463752"/>
+            <a:chExt cx="2660196" cy="527231"/>
           </a:xfrm>
         </p:grpSpPr>
         <p:sp>
@@ -27719,7 +27290,7 @@
           <p:spPr>
             <a:xfrm>
               <a:off x="2430693" y="2361221"/>
-              <a:ext cx="864472" cy="190437"/>
+              <a:ext cx="864472" cy="253916"/>
             </a:xfrm>
             <a:prstGeom prst="rect">
               <a:avLst/>
@@ -27753,7 +27324,7 @@
           <p:spPr>
             <a:xfrm>
               <a:off x="3314750" y="2361785"/>
-              <a:ext cx="864472" cy="190437"/>
+              <a:ext cx="864472" cy="253916"/>
             </a:xfrm>
             <a:prstGeom prst="rect">
               <a:avLst/>
@@ -27787,7 +27358,7 @@
           <p:spPr>
             <a:xfrm>
               <a:off x="4226417" y="2362347"/>
-              <a:ext cx="864472" cy="190437"/>
+              <a:ext cx="864472" cy="253916"/>
             </a:xfrm>
             <a:prstGeom prst="rect">
               <a:avLst/>
@@ -28033,8 +27604,8 @@
         </p:nvSpPr>
         <p:spPr>
           <a:xfrm>
-            <a:off x="357474" y="3764225"/>
-            <a:ext cx="4695479" cy="1036235"/>
+            <a:off x="357475" y="2823169"/>
+            <a:ext cx="4695479" cy="777176"/>
           </a:xfrm>
           <a:prstGeom prst="roundRect">
             <a:avLst>
@@ -28082,11 +27653,7 @@
           <a:p>
             <a:r>
               <a:rPr lang="en-US" dirty="0" smtClean="0"/>
-              <a:t>&amp; </a:t>
-            </a:r>
-            <a:r>
-              <a:rPr lang="en-US" dirty="0" smtClean="0"/>
-              <a:t>function execution</a:t>
+              <a:t>&amp; function execution</a:t>
             </a:r>
             <a:endParaRPr lang="en-US" dirty="0"/>
           </a:p>
@@ -28100,8 +27667,8 @@
         </p:nvGrpSpPr>
         <p:grpSpPr>
           <a:xfrm>
-            <a:off x="3069443" y="3912625"/>
-            <a:ext cx="1783154" cy="715156"/>
+            <a:off x="3069443" y="2934469"/>
+            <a:ext cx="1783154" cy="536367"/>
             <a:chOff x="3069443" y="3011557"/>
             <a:chExt cx="1783154" cy="536367"/>
           </a:xfrm>
@@ -28568,8 +28135,8 @@
         </p:blipFill>
         <p:spPr>
           <a:xfrm>
-            <a:off x="5568130" y="1402300"/>
-            <a:ext cx="1076216" cy="1140361"/>
+            <a:off x="5568130" y="1051725"/>
+            <a:ext cx="1076216" cy="855271"/>
           </a:xfrm>
           <a:prstGeom prst="rect">
             <a:avLst/>
@@ -28584,7 +28151,7 @@
         </p:nvSpPr>
         <p:spPr>
           <a:xfrm>
-            <a:off x="5513388" y="2766595"/>
+            <a:off x="5513388" y="2074946"/>
             <a:ext cx="3268662" cy="1938992"/>
           </a:xfrm>
           <a:prstGeom prst="rect">
@@ -28718,8 +28285,8 @@
         </p:nvSpPr>
         <p:spPr>
           <a:xfrm>
-            <a:off x="366714" y="114301"/>
-            <a:ext cx="8410575" cy="613833"/>
+            <a:off x="366715" y="85726"/>
+            <a:ext cx="8410575" cy="460375"/>
           </a:xfrm>
         </p:spPr>
         <p:txBody>
@@ -28749,7 +28316,7 @@
         </p:nvSpPr>
         <p:spPr>
           <a:xfrm>
-            <a:off x="5503982" y="2323821"/>
+            <a:off x="5503983" y="1742866"/>
             <a:ext cx="3278069" cy="2677656"/>
           </a:xfrm>
           <a:prstGeom prst="rect">
@@ -28870,8 +28437,8 @@
         </p:nvSpPr>
         <p:spPr>
           <a:xfrm>
-            <a:off x="357474" y="3800775"/>
-            <a:ext cx="4695479" cy="2197576"/>
+            <a:off x="357475" y="2850581"/>
+            <a:ext cx="4695479" cy="1648182"/>
           </a:xfrm>
           <a:prstGeom prst="roundRect">
             <a:avLst>
@@ -28933,8 +28500,8 @@
         </p:nvGrpSpPr>
         <p:grpSpPr>
           <a:xfrm>
-            <a:off x="3071984" y="4081714"/>
-            <a:ext cx="1783154" cy="1678305"/>
+            <a:off x="3071984" y="3061286"/>
+            <a:ext cx="1783154" cy="1258729"/>
             <a:chOff x="3071984" y="2975560"/>
             <a:chExt cx="1783154" cy="1258729"/>
           </a:xfrm>
@@ -29461,8 +29028,8 @@
         </p:nvSpPr>
         <p:spPr>
           <a:xfrm>
-            <a:off x="357473" y="1426656"/>
-            <a:ext cx="4695479" cy="2197576"/>
+            <a:off x="357474" y="1069992"/>
+            <a:ext cx="4695479" cy="1648182"/>
           </a:xfrm>
           <a:prstGeom prst="roundRect">
             <a:avLst>
@@ -29527,8 +29094,8 @@
         </p:nvGrpSpPr>
         <p:grpSpPr>
           <a:xfrm>
-            <a:off x="3071984" y="1689233"/>
-            <a:ext cx="1783154" cy="386311"/>
+            <a:off x="3071984" y="1266925"/>
+            <a:ext cx="1783154" cy="289733"/>
             <a:chOff x="3070641" y="3045896"/>
             <a:chExt cx="1783154" cy="289733"/>
           </a:xfrm>
@@ -29757,8 +29324,8 @@
         </p:nvSpPr>
         <p:spPr>
           <a:xfrm>
-            <a:off x="4340510" y="1428751"/>
-            <a:ext cx="685028" cy="913371"/>
+            <a:off x="4340510" y="1071564"/>
+            <a:ext cx="685028" cy="685028"/>
           </a:xfrm>
           <a:prstGeom prst="mathMultiply">
             <a:avLst>
@@ -29805,8 +29372,8 @@
         </p:nvSpPr>
         <p:spPr>
           <a:xfrm>
-            <a:off x="3374478" y="1591087"/>
-            <a:ext cx="456795" cy="609060"/>
+            <a:off x="3374479" y="1193315"/>
+            <a:ext cx="456795" cy="456795"/>
           </a:xfrm>
           <a:prstGeom prst="mathMultiply">
             <a:avLst>
@@ -29853,8 +29420,8 @@
         </p:nvGrpSpPr>
         <p:grpSpPr>
           <a:xfrm>
-            <a:off x="4526897" y="2756996"/>
-            <a:ext cx="316073" cy="393989"/>
+            <a:off x="4526898" y="2067747"/>
+            <a:ext cx="316073" cy="295492"/>
             <a:chOff x="4436907" y="3761081"/>
             <a:chExt cx="316073" cy="295492"/>
           </a:xfrm>
@@ -30006,8 +29573,8 @@
         </p:nvGrpSpPr>
         <p:grpSpPr>
           <a:xfrm>
-            <a:off x="3084153" y="2756996"/>
-            <a:ext cx="316073" cy="393989"/>
+            <a:off x="3084154" y="2067747"/>
+            <a:ext cx="316073" cy="295492"/>
             <a:chOff x="4436907" y="3761081"/>
             <a:chExt cx="316073" cy="295492"/>
           </a:xfrm>
@@ -30159,8 +29726,8 @@
         </p:nvGrpSpPr>
         <p:grpSpPr>
           <a:xfrm>
-            <a:off x="3805525" y="2756996"/>
-            <a:ext cx="316073" cy="393989"/>
+            <a:off x="3805526" y="2067747"/>
+            <a:ext cx="316073" cy="295492"/>
             <a:chOff x="4436907" y="3761081"/>
             <a:chExt cx="316073" cy="295492"/>
           </a:xfrm>
@@ -30312,8 +29879,8 @@
         </p:nvCxnSpPr>
         <p:spPr>
           <a:xfrm rot="5520000" flipH="1" flipV="1">
-            <a:off x="4315536" y="2403822"/>
-            <a:ext cx="29053" cy="668766"/>
+            <a:off x="4319168" y="1719271"/>
+            <a:ext cx="21790" cy="668766"/>
           </a:xfrm>
           <a:prstGeom prst="curvedConnector3">
             <a:avLst>
@@ -30351,8 +29918,8 @@
         </p:nvCxnSpPr>
         <p:spPr>
           <a:xfrm rot="5520000" flipH="1" flipV="1">
-            <a:off x="3579656" y="2403822"/>
-            <a:ext cx="29053" cy="668766"/>
+            <a:off x="3583288" y="1719271"/>
+            <a:ext cx="21790" cy="668766"/>
           </a:xfrm>
           <a:prstGeom prst="curvedConnector3">
             <a:avLst>
@@ -30390,8 +29957,8 @@
         </p:nvGrpSpPr>
         <p:grpSpPr>
           <a:xfrm rot="10800000">
-            <a:off x="3261238" y="3150986"/>
-            <a:ext cx="1404646" cy="29053"/>
+            <a:off x="3261238" y="2363240"/>
+            <a:ext cx="1404646" cy="21790"/>
             <a:chOff x="3412199" y="2195159"/>
             <a:chExt cx="1404646" cy="21790"/>
           </a:xfrm>
@@ -30483,7 +30050,7 @@
         </p:nvCxnSpPr>
         <p:spPr>
           <a:xfrm>
-            <a:off x="5513388" y="4810300"/>
+            <a:off x="5513388" y="3607725"/>
             <a:ext cx="3268660" cy="0"/>
           </a:xfrm>
           <a:prstGeom prst="line">
@@ -30533,8 +30100,8 @@
         </p:blipFill>
         <p:spPr bwMode="auto">
           <a:xfrm>
-            <a:off x="5503981" y="1426656"/>
-            <a:ext cx="1169300" cy="773491"/>
+            <a:off x="5503981" y="1069993"/>
+            <a:ext cx="1169300" cy="580118"/>
           </a:xfrm>
           <a:prstGeom prst="rect">
             <a:avLst/>
@@ -30612,8 +30179,8 @@
         </p:nvSpPr>
         <p:spPr bwMode="auto">
           <a:xfrm>
-            <a:off x="7739523" y="256204"/>
-            <a:ext cx="1276243" cy="5905386"/>
+            <a:off x="7739524" y="192153"/>
+            <a:ext cx="1276243" cy="4429040"/>
           </a:xfrm>
           <a:prstGeom prst="roundRect">
             <a:avLst/>
@@ -30681,8 +30248,8 @@
         </p:blipFill>
         <p:spPr>
           <a:xfrm>
-            <a:off x="1484482" y="2177404"/>
-            <a:ext cx="4090574" cy="2969189"/>
+            <a:off x="1484482" y="1633053"/>
+            <a:ext cx="4090574" cy="2226892"/>
           </a:xfrm>
           <a:prstGeom prst="rect">
             <a:avLst/>
@@ -30697,8 +30264,8 @@
         </p:nvSpPr>
         <p:spPr bwMode="auto">
           <a:xfrm>
-            <a:off x="164943" y="907250"/>
-            <a:ext cx="1764884" cy="5183525"/>
+            <a:off x="164943" y="680438"/>
+            <a:ext cx="1764884" cy="3887644"/>
           </a:xfrm>
           <a:prstGeom prst="roundRect">
             <a:avLst/>
@@ -30745,8 +30312,8 @@
         </p:nvSpPr>
         <p:spPr bwMode="auto">
           <a:xfrm>
-            <a:off x="5030749" y="272700"/>
-            <a:ext cx="2688561" cy="5888890"/>
+            <a:off x="5030750" y="204525"/>
+            <a:ext cx="2688561" cy="4416668"/>
           </a:xfrm>
           <a:prstGeom prst="roundRect">
             <a:avLst/>
@@ -30793,8 +30360,8 @@
         </p:nvSpPr>
         <p:spPr bwMode="auto">
           <a:xfrm>
-            <a:off x="6317298" y="725802"/>
-            <a:ext cx="1319540" cy="4981638"/>
+            <a:off x="6317298" y="544351"/>
+            <a:ext cx="1319540" cy="3736229"/>
           </a:xfrm>
           <a:prstGeom prst="roundRect">
             <a:avLst/>
@@ -30848,8 +30415,8 @@
         </p:nvSpPr>
         <p:spPr bwMode="auto">
           <a:xfrm>
-            <a:off x="5146207" y="1583567"/>
-            <a:ext cx="1072126" cy="2837224"/>
+            <a:off x="5146207" y="1187675"/>
+            <a:ext cx="1072126" cy="2127918"/>
           </a:xfrm>
           <a:prstGeom prst="roundRect">
             <a:avLst/>
@@ -30917,8 +30484,8 @@
         </p:blipFill>
         <p:spPr>
           <a:xfrm>
-            <a:off x="5096724" y="1891795"/>
-            <a:ext cx="1199842" cy="1199842"/>
+            <a:off x="5096724" y="1418846"/>
+            <a:ext cx="1199842" cy="899882"/>
           </a:xfrm>
           <a:prstGeom prst="rect">
             <a:avLst/>
@@ -30947,8 +30514,8 @@
         </p:blipFill>
         <p:spPr>
           <a:xfrm>
-            <a:off x="5100676" y="3050420"/>
-            <a:ext cx="1199842" cy="1199842"/>
+            <a:off x="5100676" y="2287815"/>
+            <a:ext cx="1199842" cy="899882"/>
           </a:xfrm>
           <a:prstGeom prst="rect">
             <a:avLst/>
@@ -30977,8 +30544,8 @@
         </p:blipFill>
         <p:spPr>
           <a:xfrm>
-            <a:off x="6420213" y="840024"/>
-            <a:ext cx="1199842" cy="1199842"/>
+            <a:off x="6420213" y="630018"/>
+            <a:ext cx="1199842" cy="899882"/>
           </a:xfrm>
           <a:prstGeom prst="rect">
             <a:avLst/>
@@ -31007,8 +30574,8 @@
         </p:blipFill>
         <p:spPr>
           <a:xfrm>
-            <a:off x="6420217" y="2060691"/>
-            <a:ext cx="1199842" cy="1199842"/>
+            <a:off x="6420217" y="1545518"/>
+            <a:ext cx="1199842" cy="899882"/>
           </a:xfrm>
           <a:prstGeom prst="rect">
             <a:avLst/>
@@ -31037,8 +30604,8 @@
         </p:blipFill>
         <p:spPr>
           <a:xfrm>
-            <a:off x="6420215" y="3248366"/>
-            <a:ext cx="1199842" cy="1199842"/>
+            <a:off x="6420215" y="2436274"/>
+            <a:ext cx="1199842" cy="899882"/>
           </a:xfrm>
           <a:prstGeom prst="rect">
             <a:avLst/>
@@ -31067,8 +30634,8 @@
         </p:blipFill>
         <p:spPr>
           <a:xfrm>
-            <a:off x="6420216" y="4485528"/>
-            <a:ext cx="1199842" cy="1199842"/>
+            <a:off x="6420216" y="3364146"/>
+            <a:ext cx="1199842" cy="899882"/>
           </a:xfrm>
           <a:prstGeom prst="rect">
             <a:avLst/>
@@ -31097,8 +30664,8 @@
         </p:blipFill>
         <p:spPr>
           <a:xfrm>
-            <a:off x="681362" y="1896982"/>
-            <a:ext cx="873571" cy="873571"/>
+            <a:off x="681363" y="1422737"/>
+            <a:ext cx="873571" cy="655178"/>
           </a:xfrm>
           <a:prstGeom prst="rect">
             <a:avLst/>
@@ -31127,8 +30694,8 @@
         </p:blipFill>
         <p:spPr>
           <a:xfrm>
-            <a:off x="685314" y="2907147"/>
-            <a:ext cx="873571" cy="873571"/>
+            <a:off x="685315" y="2180361"/>
+            <a:ext cx="873571" cy="655178"/>
           </a:xfrm>
           <a:prstGeom prst="rect">
             <a:avLst/>
@@ -31157,8 +30724,8 @@
         </p:blipFill>
         <p:spPr>
           <a:xfrm>
-            <a:off x="652325" y="3929868"/>
-            <a:ext cx="873571" cy="873571"/>
+            <a:off x="652326" y="2947402"/>
+            <a:ext cx="873571" cy="655178"/>
           </a:xfrm>
           <a:prstGeom prst="rect">
             <a:avLst/>
@@ -31173,7 +30740,7 @@
         </p:nvSpPr>
         <p:spPr>
           <a:xfrm>
-            <a:off x="5768220" y="313414"/>
+            <a:off x="5768220" y="235060"/>
             <a:ext cx="1583448" cy="400110"/>
           </a:xfrm>
           <a:prstGeom prst="rect">
@@ -31208,8 +30775,8 @@
         </p:nvSpPr>
         <p:spPr>
           <a:xfrm>
-            <a:off x="5067688" y="4437287"/>
-            <a:ext cx="1414553" cy="404050"/>
+            <a:off x="5067689" y="3327965"/>
+            <a:ext cx="1414553" cy="400110"/>
           </a:xfrm>
           <a:prstGeom prst="rect">
             <a:avLst/>
@@ -31244,8 +30811,8 @@
         </p:nvSpPr>
         <p:spPr>
           <a:xfrm>
-            <a:off x="6325203" y="5727876"/>
-            <a:ext cx="1414553" cy="404050"/>
+            <a:off x="6325204" y="4295907"/>
+            <a:ext cx="1414553" cy="400110"/>
           </a:xfrm>
           <a:prstGeom prst="rect">
             <a:avLst/>
@@ -31279,7 +30846,7 @@
         </p:nvSpPr>
         <p:spPr>
           <a:xfrm>
-            <a:off x="560273" y="1059651"/>
+            <a:off x="560273" y="794738"/>
             <a:ext cx="1583448" cy="400110"/>
           </a:xfrm>
           <a:prstGeom prst="rect">
@@ -31314,8 +30881,8 @@
         </p:nvSpPr>
         <p:spPr bwMode="auto">
           <a:xfrm>
-            <a:off x="313391" y="1765014"/>
-            <a:ext cx="725747" cy="412387"/>
+            <a:off x="313392" y="1323761"/>
+            <a:ext cx="725747" cy="309290"/>
           </a:xfrm>
           <a:prstGeom prst="roundRect">
             <a:avLst>
@@ -31367,8 +30934,8 @@
         </p:nvSpPr>
         <p:spPr bwMode="auto">
           <a:xfrm>
-            <a:off x="300848" y="2841162"/>
-            <a:ext cx="725747" cy="412387"/>
+            <a:off x="300849" y="2130872"/>
+            <a:ext cx="725747" cy="309290"/>
           </a:xfrm>
           <a:prstGeom prst="roundRect">
             <a:avLst>
@@ -31420,8 +30987,8 @@
         </p:nvSpPr>
         <p:spPr bwMode="auto">
           <a:xfrm>
-            <a:off x="300849" y="3814399"/>
-            <a:ext cx="725747" cy="412387"/>
+            <a:off x="300850" y="2860800"/>
+            <a:ext cx="725747" cy="309290"/>
           </a:xfrm>
           <a:prstGeom prst="roundRect">
             <a:avLst>
@@ -31473,8 +31040,8 @@
         </p:nvSpPr>
         <p:spPr bwMode="auto">
           <a:xfrm>
-            <a:off x="1995804" y="3150639"/>
-            <a:ext cx="3018448" cy="1105197"/>
+            <a:off x="1995804" y="2362980"/>
+            <a:ext cx="3018448" cy="828898"/>
           </a:xfrm>
           <a:prstGeom prst="leftRightArrow">
             <a:avLst/>
@@ -31539,7 +31106,7 @@
         </p:nvSpPr>
         <p:spPr>
           <a:xfrm>
-            <a:off x="2672069" y="4437287"/>
+            <a:off x="2672069" y="3327966"/>
             <a:ext cx="1995804" cy="1015663"/>
           </a:xfrm>
           <a:prstGeom prst="rect">
@@ -31608,8 +31175,8 @@
         </p:blipFill>
         <p:spPr>
           <a:xfrm flipH="1">
-            <a:off x="7950227" y="1642955"/>
-            <a:ext cx="913369" cy="913369"/>
+            <a:off x="7950228" y="1232217"/>
+            <a:ext cx="913369" cy="685027"/>
           </a:xfrm>
           <a:prstGeom prst="rect">
             <a:avLst/>
@@ -31638,8 +31205,8 @@
         </p:blipFill>
         <p:spPr>
           <a:xfrm>
-            <a:off x="8023938" y="2789182"/>
-            <a:ext cx="914400" cy="685800"/>
+            <a:off x="8023938" y="2091887"/>
+            <a:ext cx="914400" cy="514350"/>
           </a:xfrm>
           <a:prstGeom prst="rect">
             <a:avLst/>
@@ -31668,8 +31235,8 @@
         </p:blipFill>
         <p:spPr>
           <a:xfrm>
-            <a:off x="7817685" y="3612512"/>
-            <a:ext cx="1062407" cy="1062407"/>
+            <a:off x="7817686" y="2709385"/>
+            <a:ext cx="1062407" cy="796805"/>
           </a:xfrm>
           <a:prstGeom prst="rect">
             <a:avLst/>
@@ -31684,8 +31251,8 @@
         </p:nvSpPr>
         <p:spPr>
           <a:xfrm>
-            <a:off x="7737373" y="531792"/>
-            <a:ext cx="1583448" cy="830997"/>
+            <a:off x="7737373" y="398844"/>
+            <a:ext cx="1583448" cy="707886"/>
           </a:xfrm>
           <a:prstGeom prst="rect">
             <a:avLst/>
@@ -31731,7 +31298,7 @@
         </p:nvSpPr>
         <p:spPr>
           <a:xfrm>
-            <a:off x="201883" y="4969083"/>
+            <a:off x="201883" y="3726813"/>
             <a:ext cx="2107312" cy="1015663"/>
           </a:xfrm>
           <a:prstGeom prst="rect">
@@ -31788,7 +31355,7 @@
         </p:nvSpPr>
         <p:spPr>
           <a:xfrm>
-            <a:off x="6970282" y="4638761"/>
+            <a:off x="6970282" y="3479071"/>
             <a:ext cx="2107312" cy="1015663"/>
           </a:xfrm>
           <a:prstGeom prst="rect">
@@ -31852,8 +31419,8 @@
         </p:nvSpPr>
         <p:spPr>
           <a:xfrm>
-            <a:off x="251366" y="224875"/>
-            <a:ext cx="8410575" cy="613833"/>
+            <a:off x="251367" y="168657"/>
+            <a:ext cx="8410575" cy="460375"/>
           </a:xfrm>
         </p:spPr>
         <p:txBody>
@@ -32319,8 +31886,8 @@
         </p:nvSpPr>
         <p:spPr bwMode="auto">
           <a:xfrm>
-            <a:off x="6179932" y="3771900"/>
-            <a:ext cx="2156236" cy="2070099"/>
+            <a:off x="6179932" y="2828926"/>
+            <a:ext cx="2156236" cy="1552574"/>
           </a:xfrm>
           <a:prstGeom prst="rect">
             <a:avLst/>
@@ -32362,8 +31929,8 @@
         </p:nvSpPr>
         <p:spPr bwMode="auto">
           <a:xfrm>
-            <a:off x="3493882" y="3771900"/>
-            <a:ext cx="2156236" cy="2070099"/>
+            <a:off x="3493882" y="2828926"/>
+            <a:ext cx="2156236" cy="1552574"/>
           </a:xfrm>
           <a:prstGeom prst="rect">
             <a:avLst/>
@@ -32426,8 +31993,8 @@
         </p:nvGrpSpPr>
         <p:grpSpPr>
           <a:xfrm>
-            <a:off x="6189457" y="787400"/>
-            <a:ext cx="2156236" cy="1219200"/>
+            <a:off x="6189457" y="590550"/>
+            <a:ext cx="2156236" cy="914400"/>
             <a:chOff x="6208507" y="590550"/>
             <a:chExt cx="2156236" cy="914400"/>
           </a:xfrm>
@@ -32486,7 +32053,7 @@
           <p:spPr bwMode="auto">
             <a:xfrm>
               <a:off x="7449882" y="754857"/>
-              <a:ext cx="813043" cy="173124"/>
+              <a:ext cx="813043" cy="230832"/>
             </a:xfrm>
             <a:prstGeom prst="rect">
               <a:avLst/>
@@ -32577,7 +32144,7 @@
         </p:nvSpPr>
         <p:spPr bwMode="auto">
           <a:xfrm>
-            <a:off x="7745158" y="5540376"/>
+            <a:off x="7745158" y="4155282"/>
             <a:ext cx="531084" cy="230832"/>
           </a:xfrm>
           <a:prstGeom prst="rect">
@@ -32641,8 +32208,8 @@
         </p:nvGrpSpPr>
         <p:grpSpPr>
           <a:xfrm>
-            <a:off x="3503407" y="787400"/>
-            <a:ext cx="2156236" cy="1219200"/>
+            <a:off x="3503407" y="590550"/>
+            <a:ext cx="2156236" cy="914400"/>
             <a:chOff x="3551032" y="590550"/>
             <a:chExt cx="2156236" cy="914400"/>
           </a:xfrm>
@@ -32701,7 +32268,7 @@
           <p:spPr bwMode="auto">
             <a:xfrm>
               <a:off x="4763832" y="754857"/>
-              <a:ext cx="813043" cy="173124"/>
+              <a:ext cx="813043" cy="230832"/>
             </a:xfrm>
             <a:prstGeom prst="rect">
               <a:avLst/>
@@ -32792,7 +32359,7 @@
         </p:nvSpPr>
         <p:spPr bwMode="auto">
           <a:xfrm>
-            <a:off x="5059108" y="5540376"/>
+            <a:off x="5059108" y="4155282"/>
             <a:ext cx="531084" cy="230832"/>
           </a:xfrm>
           <a:prstGeom prst="rect">
@@ -32858,8 +32425,8 @@
         </p:nvSpPr>
         <p:spPr bwMode="auto">
           <a:xfrm>
-            <a:off x="807832" y="3771900"/>
-            <a:ext cx="2156236" cy="2070099"/>
+            <a:off x="807832" y="2828926"/>
+            <a:ext cx="2156236" cy="1552574"/>
           </a:xfrm>
           <a:prstGeom prst="rect">
             <a:avLst/>
@@ -32899,8 +32466,8 @@
         </p:nvGrpSpPr>
         <p:grpSpPr>
           <a:xfrm>
-            <a:off x="807832" y="787400"/>
-            <a:ext cx="2156236" cy="1219200"/>
+            <a:off x="807832" y="590550"/>
+            <a:ext cx="2156236" cy="914400"/>
             <a:chOff x="807832" y="590550"/>
             <a:chExt cx="2156236" cy="914400"/>
           </a:xfrm>
@@ -32959,7 +32526,7 @@
           <p:spPr bwMode="auto">
             <a:xfrm>
               <a:off x="2077782" y="754857"/>
-              <a:ext cx="813043" cy="173124"/>
+              <a:ext cx="813043" cy="230832"/>
             </a:xfrm>
             <a:prstGeom prst="rect">
               <a:avLst/>
@@ -33050,7 +32617,7 @@
         </p:nvSpPr>
         <p:spPr bwMode="auto">
           <a:xfrm>
-            <a:off x="2373058" y="5540376"/>
+            <a:off x="2373058" y="4155282"/>
             <a:ext cx="531084" cy="230832"/>
           </a:xfrm>
           <a:prstGeom prst="rect">
@@ -33114,8 +32681,8 @@
         </p:nvGrpSpPr>
         <p:grpSpPr>
           <a:xfrm>
-            <a:off x="2888456" y="4013201"/>
-            <a:ext cx="721520" cy="1739899"/>
+            <a:off x="2888456" y="3009901"/>
+            <a:ext cx="721520" cy="1304924"/>
             <a:chOff x="3026569" y="3581399"/>
             <a:chExt cx="554831" cy="907258"/>
           </a:xfrm>
@@ -33462,8 +33029,8 @@
         </p:nvGrpSpPr>
         <p:grpSpPr>
           <a:xfrm>
-            <a:off x="907845" y="4025901"/>
-            <a:ext cx="1958975" cy="1546225"/>
+            <a:off x="907846" y="3019426"/>
+            <a:ext cx="1958975" cy="1159669"/>
             <a:chOff x="907844" y="3019425"/>
             <a:chExt cx="1958975" cy="1159669"/>
           </a:xfrm>
@@ -33690,8 +33257,8 @@
         </p:nvGrpSpPr>
         <p:grpSpPr>
           <a:xfrm>
-            <a:off x="5574506" y="4013201"/>
-            <a:ext cx="721520" cy="1739899"/>
+            <a:off x="5574506" y="3009901"/>
+            <a:ext cx="721520" cy="1304924"/>
             <a:chOff x="3026569" y="3581399"/>
             <a:chExt cx="554831" cy="907258"/>
           </a:xfrm>
@@ -34038,8 +33605,8 @@
         </p:nvGrpSpPr>
         <p:grpSpPr>
           <a:xfrm>
-            <a:off x="6279945" y="4025901"/>
-            <a:ext cx="1958975" cy="1546225"/>
+            <a:off x="6279946" y="3019426"/>
+            <a:ext cx="1958975" cy="1159669"/>
             <a:chOff x="6279944" y="2390775"/>
             <a:chExt cx="1958975" cy="1159669"/>
           </a:xfrm>
@@ -34266,8 +33833,8 @@
         </p:nvGrpSpPr>
         <p:grpSpPr>
           <a:xfrm>
-            <a:off x="3593895" y="4025901"/>
-            <a:ext cx="1958975" cy="1546225"/>
+            <a:off x="3593896" y="3019426"/>
+            <a:ext cx="1958975" cy="1159669"/>
             <a:chOff x="3593894" y="2390775"/>
             <a:chExt cx="1958975" cy="1159669"/>
           </a:xfrm>
@@ -34494,8 +34061,8 @@
         </p:nvGrpSpPr>
         <p:grpSpPr>
           <a:xfrm>
-            <a:off x="1885157" y="2006599"/>
-            <a:ext cx="5372894" cy="1766359"/>
+            <a:off x="1885157" y="1504950"/>
+            <a:ext cx="5372894" cy="1324769"/>
             <a:chOff x="1885157" y="1504949"/>
             <a:chExt cx="5372894" cy="1324769"/>
           </a:xfrm>
@@ -34605,8 +34172,8 @@
         </p:nvGrpSpPr>
         <p:grpSpPr>
           <a:xfrm>
-            <a:off x="1885952" y="2006599"/>
-            <a:ext cx="5372099" cy="1765301"/>
+            <a:off x="1885953" y="1504950"/>
+            <a:ext cx="5372099" cy="1323976"/>
             <a:chOff x="1885951" y="1504949"/>
             <a:chExt cx="5372099" cy="1323976"/>
           </a:xfrm>
@@ -34716,8 +34283,8 @@
         </p:nvGrpSpPr>
         <p:grpSpPr>
           <a:xfrm>
-            <a:off x="1885952" y="2006601"/>
-            <a:ext cx="5381625" cy="1765300"/>
+            <a:off x="1885953" y="1504951"/>
+            <a:ext cx="5381625" cy="1323975"/>
             <a:chOff x="1885951" y="1504950"/>
             <a:chExt cx="5381625" cy="1323975"/>
           </a:xfrm>

</xml_diff>